<commit_message>
wrote on HA 07 + 08
</commit_message>
<xml_diff>
--- a/Portfolio/Hausaufgaben/8_Kaufprozess/Kaufprozess_Grafik.pptx
+++ b/Portfolio/Hausaufgaben/8_Kaufprozess/Kaufprozess_Grafik.pptx
@@ -7,7 +7,7 @@
   <p:sldIdLst>
     <p:sldId id="256" r:id="rId3"/>
   </p:sldIdLst>
-  <p:sldSz cx="10080625" cy="5670550"/>
+  <p:sldSz cx="5670550" cy="10080625"/>
   <p:notesSz cx="7772400" cy="10058400"/>
 </p:presentation>
 </file>
@@ -53,7 +53,7 @@
       </p:grpSpPr>
       <p:sp>
         <p:nvSpPr>
-          <p:cNvPr id="22" name="PlaceHolder 1"/>
+          <p:cNvPr id="23" name="PlaceHolder 1"/>
           <p:cNvSpPr>
             <a:spLocks noGrp="1"/>
           </p:cNvSpPr>
@@ -63,80 +63,94 @@
         </p:nvSpPr>
         <p:spPr>
           <a:xfrm>
-            <a:off x="504000" y="226080"/>
-            <a:ext cx="9071280" cy="946080"/>
-          </a:xfrm>
-          <a:prstGeom prst="rect">
-            <a:avLst/>
-          </a:prstGeom>
+            <a:off x="283320" y="134280"/>
+            <a:ext cx="5101920" cy="2216520"/>
+          </a:xfrm>
+          <a:prstGeom prst="rect">
+            <a:avLst/>
+          </a:prstGeom>
+          <a:noFill/>
+          <a:ln w="0">
+            <a:noFill/>
+          </a:ln>
         </p:spPr>
         <p:txBody>
           <a:bodyPr lIns="0" rIns="0" tIns="0" bIns="0" anchor="ctr">
             <a:noAutofit/>
           </a:bodyPr>
           <a:p>
-            <a:pPr algn="ctr"/>
-            <a:endParaRPr b="0" lang="de-DE" sz="4400" spc="-1" strike="noStrike">
-              <a:latin typeface="Arial"/>
-            </a:endParaRPr>
-          </a:p>
-        </p:txBody>
-      </p:sp>
-      <p:sp>
-        <p:nvSpPr>
-          <p:cNvPr id="23" name="PlaceHolder 2"/>
-          <p:cNvSpPr>
-            <a:spLocks noGrp="1"/>
-          </p:cNvSpPr>
-          <p:nvPr>
-            <p:ph type="body"/>
-          </p:nvPr>
-        </p:nvSpPr>
-        <p:spPr>
-          <a:xfrm>
-            <a:off x="504000" y="1326600"/>
-            <a:ext cx="9072000" cy="1568520"/>
-          </a:xfrm>
-          <a:prstGeom prst="rect">
-            <a:avLst/>
-          </a:prstGeom>
-        </p:spPr>
-        <p:txBody>
-          <a:bodyPr lIns="0" rIns="0" tIns="0" bIns="0">
+            <a:pPr algn="ctr">
+              <a:buNone/>
+            </a:pPr>
+            <a:endParaRPr b="0" lang="de-DE" sz="7819" spc="-1" strike="noStrike">
+              <a:latin typeface="Arial"/>
+            </a:endParaRPr>
+          </a:p>
+        </p:txBody>
+      </p:sp>
+      <p:sp>
+        <p:nvSpPr>
+          <p:cNvPr id="24" name="PlaceHolder 2"/>
+          <p:cNvSpPr>
+            <a:spLocks noGrp="1"/>
+          </p:cNvSpPr>
+          <p:nvPr>
+            <p:ph/>
+          </p:nvPr>
+        </p:nvSpPr>
+        <p:spPr>
+          <a:xfrm>
+            <a:off x="283320" y="2358000"/>
+            <a:ext cx="5102280" cy="2787840"/>
+          </a:xfrm>
+          <a:prstGeom prst="rect">
+            <a:avLst/>
+          </a:prstGeom>
+          <a:noFill/>
+          <a:ln w="0">
+            <a:noFill/>
+          </a:ln>
+        </p:spPr>
+        <p:txBody>
+          <a:bodyPr lIns="0" rIns="0" tIns="0" bIns="0" anchor="t">
             <a:normAutofit/>
           </a:bodyPr>
           <a:p>
-            <a:endParaRPr b="0" lang="de-DE" sz="3200" spc="-1" strike="noStrike">
-              <a:latin typeface="Arial"/>
-            </a:endParaRPr>
-          </a:p>
-        </p:txBody>
-      </p:sp>
-      <p:sp>
-        <p:nvSpPr>
-          <p:cNvPr id="24" name="PlaceHolder 3"/>
-          <p:cNvSpPr>
-            <a:spLocks noGrp="1"/>
-          </p:cNvSpPr>
-          <p:nvPr>
-            <p:ph type="body"/>
-          </p:nvPr>
-        </p:nvSpPr>
-        <p:spPr>
-          <a:xfrm>
-            <a:off x="504000" y="3044520"/>
-            <a:ext cx="9072000" cy="1568520"/>
-          </a:xfrm>
-          <a:prstGeom prst="rect">
-            <a:avLst/>
-          </a:prstGeom>
-        </p:spPr>
-        <p:txBody>
-          <a:bodyPr lIns="0" rIns="0" tIns="0" bIns="0">
+            <a:endParaRPr b="0" lang="de-DE" sz="5690" spc="-1" strike="noStrike">
+              <a:latin typeface="Arial"/>
+            </a:endParaRPr>
+          </a:p>
+        </p:txBody>
+      </p:sp>
+      <p:sp>
+        <p:nvSpPr>
+          <p:cNvPr id="25" name="PlaceHolder 3"/>
+          <p:cNvSpPr>
+            <a:spLocks noGrp="1"/>
+          </p:cNvSpPr>
+          <p:nvPr>
+            <p:ph/>
+          </p:nvPr>
+        </p:nvSpPr>
+        <p:spPr>
+          <a:xfrm>
+            <a:off x="283320" y="5411160"/>
+            <a:ext cx="5102280" cy="2787840"/>
+          </a:xfrm>
+          <a:prstGeom prst="rect">
+            <a:avLst/>
+          </a:prstGeom>
+          <a:noFill/>
+          <a:ln w="0">
+            <a:noFill/>
+          </a:ln>
+        </p:spPr>
+        <p:txBody>
+          <a:bodyPr lIns="0" rIns="0" tIns="0" bIns="0" anchor="t">
             <a:normAutofit/>
           </a:bodyPr>
           <a:p>
-            <a:endParaRPr b="0" lang="de-DE" sz="3200" spc="-1" strike="noStrike">
+            <a:endParaRPr b="0" lang="de-DE" sz="5690" spc="-1" strike="noStrike">
               <a:latin typeface="Arial"/>
             </a:endParaRPr>
           </a:p>
@@ -166,7 +180,7 @@
       </p:grpSpPr>
       <p:sp>
         <p:nvSpPr>
-          <p:cNvPr id="25" name="PlaceHolder 1"/>
+          <p:cNvPr id="26" name="PlaceHolder 1"/>
           <p:cNvSpPr>
             <a:spLocks noGrp="1"/>
           </p:cNvSpPr>
@@ -176,140 +190,162 @@
         </p:nvSpPr>
         <p:spPr>
           <a:xfrm>
-            <a:off x="504000" y="226080"/>
-            <a:ext cx="9071280" cy="946080"/>
-          </a:xfrm>
-          <a:prstGeom prst="rect">
-            <a:avLst/>
-          </a:prstGeom>
+            <a:off x="283320" y="134280"/>
+            <a:ext cx="5101920" cy="2216520"/>
+          </a:xfrm>
+          <a:prstGeom prst="rect">
+            <a:avLst/>
+          </a:prstGeom>
+          <a:noFill/>
+          <a:ln w="0">
+            <a:noFill/>
+          </a:ln>
         </p:spPr>
         <p:txBody>
           <a:bodyPr lIns="0" rIns="0" tIns="0" bIns="0" anchor="ctr">
             <a:noAutofit/>
           </a:bodyPr>
           <a:p>
-            <a:pPr algn="ctr"/>
-            <a:endParaRPr b="0" lang="de-DE" sz="4400" spc="-1" strike="noStrike">
-              <a:latin typeface="Arial"/>
-            </a:endParaRPr>
-          </a:p>
-        </p:txBody>
-      </p:sp>
-      <p:sp>
-        <p:nvSpPr>
-          <p:cNvPr id="26" name="PlaceHolder 2"/>
-          <p:cNvSpPr>
-            <a:spLocks noGrp="1"/>
-          </p:cNvSpPr>
-          <p:nvPr>
-            <p:ph type="body"/>
-          </p:nvPr>
-        </p:nvSpPr>
-        <p:spPr>
-          <a:xfrm>
-            <a:off x="504000" y="1326600"/>
-            <a:ext cx="4426920" cy="1568520"/>
-          </a:xfrm>
-          <a:prstGeom prst="rect">
-            <a:avLst/>
-          </a:prstGeom>
-        </p:spPr>
-        <p:txBody>
-          <a:bodyPr lIns="0" rIns="0" tIns="0" bIns="0">
+            <a:pPr algn="ctr">
+              <a:buNone/>
+            </a:pPr>
+            <a:endParaRPr b="0" lang="de-DE" sz="7819" spc="-1" strike="noStrike">
+              <a:latin typeface="Arial"/>
+            </a:endParaRPr>
+          </a:p>
+        </p:txBody>
+      </p:sp>
+      <p:sp>
+        <p:nvSpPr>
+          <p:cNvPr id="27" name="PlaceHolder 2"/>
+          <p:cNvSpPr>
+            <a:spLocks noGrp="1"/>
+          </p:cNvSpPr>
+          <p:nvPr>
+            <p:ph/>
+          </p:nvPr>
+        </p:nvSpPr>
+        <p:spPr>
+          <a:xfrm>
+            <a:off x="283320" y="2358000"/>
+            <a:ext cx="2489760" cy="2787840"/>
+          </a:xfrm>
+          <a:prstGeom prst="rect">
+            <a:avLst/>
+          </a:prstGeom>
+          <a:noFill/>
+          <a:ln w="0">
+            <a:noFill/>
+          </a:ln>
+        </p:spPr>
+        <p:txBody>
+          <a:bodyPr lIns="0" rIns="0" tIns="0" bIns="0" anchor="t">
             <a:normAutofit/>
           </a:bodyPr>
           <a:p>
-            <a:endParaRPr b="0" lang="de-DE" sz="3200" spc="-1" strike="noStrike">
-              <a:latin typeface="Arial"/>
-            </a:endParaRPr>
-          </a:p>
-        </p:txBody>
-      </p:sp>
-      <p:sp>
-        <p:nvSpPr>
-          <p:cNvPr id="27" name="PlaceHolder 3"/>
-          <p:cNvSpPr>
-            <a:spLocks noGrp="1"/>
-          </p:cNvSpPr>
-          <p:nvPr>
-            <p:ph type="body"/>
-          </p:nvPr>
-        </p:nvSpPr>
-        <p:spPr>
-          <a:xfrm>
-            <a:off x="5152680" y="1326600"/>
-            <a:ext cx="4426920" cy="1568520"/>
-          </a:xfrm>
-          <a:prstGeom prst="rect">
-            <a:avLst/>
-          </a:prstGeom>
-        </p:spPr>
-        <p:txBody>
-          <a:bodyPr lIns="0" rIns="0" tIns="0" bIns="0">
+            <a:endParaRPr b="0" lang="de-DE" sz="5690" spc="-1" strike="noStrike">
+              <a:latin typeface="Arial"/>
+            </a:endParaRPr>
+          </a:p>
+        </p:txBody>
+      </p:sp>
+      <p:sp>
+        <p:nvSpPr>
+          <p:cNvPr id="28" name="PlaceHolder 3"/>
+          <p:cNvSpPr>
+            <a:spLocks noGrp="1"/>
+          </p:cNvSpPr>
+          <p:nvPr>
+            <p:ph/>
+          </p:nvPr>
+        </p:nvSpPr>
+        <p:spPr>
+          <a:xfrm>
+            <a:off x="2898000" y="2358000"/>
+            <a:ext cx="2489760" cy="2787840"/>
+          </a:xfrm>
+          <a:prstGeom prst="rect">
+            <a:avLst/>
+          </a:prstGeom>
+          <a:noFill/>
+          <a:ln w="0">
+            <a:noFill/>
+          </a:ln>
+        </p:spPr>
+        <p:txBody>
+          <a:bodyPr lIns="0" rIns="0" tIns="0" bIns="0" anchor="t">
             <a:normAutofit/>
           </a:bodyPr>
           <a:p>
-            <a:endParaRPr b="0" lang="de-DE" sz="3200" spc="-1" strike="noStrike">
-              <a:latin typeface="Arial"/>
-            </a:endParaRPr>
-          </a:p>
-        </p:txBody>
-      </p:sp>
-      <p:sp>
-        <p:nvSpPr>
-          <p:cNvPr id="28" name="PlaceHolder 4"/>
-          <p:cNvSpPr>
-            <a:spLocks noGrp="1"/>
-          </p:cNvSpPr>
-          <p:nvPr>
-            <p:ph type="body"/>
-          </p:nvPr>
-        </p:nvSpPr>
-        <p:spPr>
-          <a:xfrm>
-            <a:off x="504000" y="3044520"/>
-            <a:ext cx="4426920" cy="1568520"/>
-          </a:xfrm>
-          <a:prstGeom prst="rect">
-            <a:avLst/>
-          </a:prstGeom>
-        </p:spPr>
-        <p:txBody>
-          <a:bodyPr lIns="0" rIns="0" tIns="0" bIns="0">
+            <a:endParaRPr b="0" lang="de-DE" sz="5690" spc="-1" strike="noStrike">
+              <a:latin typeface="Arial"/>
+            </a:endParaRPr>
+          </a:p>
+        </p:txBody>
+      </p:sp>
+      <p:sp>
+        <p:nvSpPr>
+          <p:cNvPr id="29" name="PlaceHolder 4"/>
+          <p:cNvSpPr>
+            <a:spLocks noGrp="1"/>
+          </p:cNvSpPr>
+          <p:nvPr>
+            <p:ph/>
+          </p:nvPr>
+        </p:nvSpPr>
+        <p:spPr>
+          <a:xfrm>
+            <a:off x="283320" y="5411160"/>
+            <a:ext cx="2489760" cy="2787840"/>
+          </a:xfrm>
+          <a:prstGeom prst="rect">
+            <a:avLst/>
+          </a:prstGeom>
+          <a:noFill/>
+          <a:ln w="0">
+            <a:noFill/>
+          </a:ln>
+        </p:spPr>
+        <p:txBody>
+          <a:bodyPr lIns="0" rIns="0" tIns="0" bIns="0" anchor="t">
             <a:normAutofit/>
           </a:bodyPr>
           <a:p>
-            <a:endParaRPr b="0" lang="de-DE" sz="3200" spc="-1" strike="noStrike">
-              <a:latin typeface="Arial"/>
-            </a:endParaRPr>
-          </a:p>
-        </p:txBody>
-      </p:sp>
-      <p:sp>
-        <p:nvSpPr>
-          <p:cNvPr id="29" name="PlaceHolder 5"/>
-          <p:cNvSpPr>
-            <a:spLocks noGrp="1"/>
-          </p:cNvSpPr>
-          <p:nvPr>
-            <p:ph type="body"/>
-          </p:nvPr>
-        </p:nvSpPr>
-        <p:spPr>
-          <a:xfrm>
-            <a:off x="5152680" y="3044520"/>
-            <a:ext cx="4426920" cy="1568520"/>
-          </a:xfrm>
-          <a:prstGeom prst="rect">
-            <a:avLst/>
-          </a:prstGeom>
-        </p:spPr>
-        <p:txBody>
-          <a:bodyPr lIns="0" rIns="0" tIns="0" bIns="0">
+            <a:endParaRPr b="0" lang="de-DE" sz="5690" spc="-1" strike="noStrike">
+              <a:latin typeface="Arial"/>
+            </a:endParaRPr>
+          </a:p>
+        </p:txBody>
+      </p:sp>
+      <p:sp>
+        <p:nvSpPr>
+          <p:cNvPr id="30" name="PlaceHolder 5"/>
+          <p:cNvSpPr>
+            <a:spLocks noGrp="1"/>
+          </p:cNvSpPr>
+          <p:nvPr>
+            <p:ph/>
+          </p:nvPr>
+        </p:nvSpPr>
+        <p:spPr>
+          <a:xfrm>
+            <a:off x="2898000" y="5411160"/>
+            <a:ext cx="2489760" cy="2787840"/>
+          </a:xfrm>
+          <a:prstGeom prst="rect">
+            <a:avLst/>
+          </a:prstGeom>
+          <a:noFill/>
+          <a:ln w="0">
+            <a:noFill/>
+          </a:ln>
+        </p:spPr>
+        <p:txBody>
+          <a:bodyPr lIns="0" rIns="0" tIns="0" bIns="0" anchor="t">
             <a:normAutofit/>
           </a:bodyPr>
           <a:p>
-            <a:endParaRPr b="0" lang="de-DE" sz="3200" spc="-1" strike="noStrike">
+            <a:endParaRPr b="0" lang="de-DE" sz="5690" spc="-1" strike="noStrike">
               <a:latin typeface="Arial"/>
             </a:endParaRPr>
           </a:p>
@@ -339,7 +375,7 @@
       </p:grpSpPr>
       <p:sp>
         <p:nvSpPr>
-          <p:cNvPr id="30" name="PlaceHolder 1"/>
+          <p:cNvPr id="31" name="PlaceHolder 1"/>
           <p:cNvSpPr>
             <a:spLocks noGrp="1"/>
           </p:cNvSpPr>
@@ -349,200 +385,230 @@
         </p:nvSpPr>
         <p:spPr>
           <a:xfrm>
-            <a:off x="504000" y="226080"/>
-            <a:ext cx="9071280" cy="946080"/>
-          </a:xfrm>
-          <a:prstGeom prst="rect">
-            <a:avLst/>
-          </a:prstGeom>
+            <a:off x="283320" y="134280"/>
+            <a:ext cx="5101920" cy="2216520"/>
+          </a:xfrm>
+          <a:prstGeom prst="rect">
+            <a:avLst/>
+          </a:prstGeom>
+          <a:noFill/>
+          <a:ln w="0">
+            <a:noFill/>
+          </a:ln>
         </p:spPr>
         <p:txBody>
           <a:bodyPr lIns="0" rIns="0" tIns="0" bIns="0" anchor="ctr">
             <a:noAutofit/>
           </a:bodyPr>
           <a:p>
-            <a:pPr algn="ctr"/>
-            <a:endParaRPr b="0" lang="de-DE" sz="4400" spc="-1" strike="noStrike">
-              <a:latin typeface="Arial"/>
-            </a:endParaRPr>
-          </a:p>
-        </p:txBody>
-      </p:sp>
-      <p:sp>
-        <p:nvSpPr>
-          <p:cNvPr id="31" name="PlaceHolder 2"/>
-          <p:cNvSpPr>
-            <a:spLocks noGrp="1"/>
-          </p:cNvSpPr>
-          <p:nvPr>
-            <p:ph type="body"/>
-          </p:nvPr>
-        </p:nvSpPr>
-        <p:spPr>
-          <a:xfrm>
-            <a:off x="504000" y="1326600"/>
-            <a:ext cx="2921040" cy="1568520"/>
-          </a:xfrm>
-          <a:prstGeom prst="rect">
-            <a:avLst/>
-          </a:prstGeom>
-        </p:spPr>
-        <p:txBody>
-          <a:bodyPr lIns="0" rIns="0" tIns="0" bIns="0">
-            <a:normAutofit/>
-          </a:bodyPr>
-          <a:p>
-            <a:endParaRPr b="0" lang="de-DE" sz="3200" spc="-1" strike="noStrike">
-              <a:latin typeface="Arial"/>
-            </a:endParaRPr>
-          </a:p>
-        </p:txBody>
-      </p:sp>
-      <p:sp>
-        <p:nvSpPr>
-          <p:cNvPr id="32" name="PlaceHolder 3"/>
-          <p:cNvSpPr>
-            <a:spLocks noGrp="1"/>
-          </p:cNvSpPr>
-          <p:nvPr>
-            <p:ph type="body"/>
-          </p:nvPr>
-        </p:nvSpPr>
-        <p:spPr>
-          <a:xfrm>
-            <a:off x="3571560" y="1326600"/>
-            <a:ext cx="2921040" cy="1568520"/>
-          </a:xfrm>
-          <a:prstGeom prst="rect">
-            <a:avLst/>
-          </a:prstGeom>
-        </p:spPr>
-        <p:txBody>
-          <a:bodyPr lIns="0" rIns="0" tIns="0" bIns="0">
-            <a:normAutofit/>
-          </a:bodyPr>
-          <a:p>
-            <a:endParaRPr b="0" lang="de-DE" sz="3200" spc="-1" strike="noStrike">
-              <a:latin typeface="Arial"/>
-            </a:endParaRPr>
-          </a:p>
-        </p:txBody>
-      </p:sp>
-      <p:sp>
-        <p:nvSpPr>
-          <p:cNvPr id="33" name="PlaceHolder 4"/>
-          <p:cNvSpPr>
-            <a:spLocks noGrp="1"/>
-          </p:cNvSpPr>
-          <p:nvPr>
-            <p:ph type="body"/>
-          </p:nvPr>
-        </p:nvSpPr>
-        <p:spPr>
-          <a:xfrm>
-            <a:off x="6639120" y="1326600"/>
-            <a:ext cx="2921040" cy="1568520"/>
-          </a:xfrm>
-          <a:prstGeom prst="rect">
-            <a:avLst/>
-          </a:prstGeom>
-        </p:spPr>
-        <p:txBody>
-          <a:bodyPr lIns="0" rIns="0" tIns="0" bIns="0">
-            <a:normAutofit/>
-          </a:bodyPr>
-          <a:p>
-            <a:endParaRPr b="0" lang="de-DE" sz="3200" spc="-1" strike="noStrike">
-              <a:latin typeface="Arial"/>
-            </a:endParaRPr>
-          </a:p>
-        </p:txBody>
-      </p:sp>
-      <p:sp>
-        <p:nvSpPr>
-          <p:cNvPr id="34" name="PlaceHolder 5"/>
-          <p:cNvSpPr>
-            <a:spLocks noGrp="1"/>
-          </p:cNvSpPr>
-          <p:nvPr>
-            <p:ph type="body"/>
-          </p:nvPr>
-        </p:nvSpPr>
-        <p:spPr>
-          <a:xfrm>
-            <a:off x="504000" y="3044520"/>
-            <a:ext cx="2921040" cy="1568520"/>
-          </a:xfrm>
-          <a:prstGeom prst="rect">
-            <a:avLst/>
-          </a:prstGeom>
-        </p:spPr>
-        <p:txBody>
-          <a:bodyPr lIns="0" rIns="0" tIns="0" bIns="0">
-            <a:normAutofit/>
-          </a:bodyPr>
-          <a:p>
-            <a:endParaRPr b="0" lang="de-DE" sz="3200" spc="-1" strike="noStrike">
-              <a:latin typeface="Arial"/>
-            </a:endParaRPr>
-          </a:p>
-        </p:txBody>
-      </p:sp>
-      <p:sp>
-        <p:nvSpPr>
-          <p:cNvPr id="35" name="PlaceHolder 6"/>
-          <p:cNvSpPr>
-            <a:spLocks noGrp="1"/>
-          </p:cNvSpPr>
-          <p:nvPr>
-            <p:ph type="body"/>
-          </p:nvPr>
-        </p:nvSpPr>
-        <p:spPr>
-          <a:xfrm>
-            <a:off x="3571560" y="3044520"/>
-            <a:ext cx="2921040" cy="1568520"/>
-          </a:xfrm>
-          <a:prstGeom prst="rect">
-            <a:avLst/>
-          </a:prstGeom>
-        </p:spPr>
-        <p:txBody>
-          <a:bodyPr lIns="0" rIns="0" tIns="0" bIns="0">
-            <a:normAutofit/>
-          </a:bodyPr>
-          <a:p>
-            <a:endParaRPr b="0" lang="de-DE" sz="3200" spc="-1" strike="noStrike">
-              <a:latin typeface="Arial"/>
-            </a:endParaRPr>
-          </a:p>
-        </p:txBody>
-      </p:sp>
-      <p:sp>
-        <p:nvSpPr>
-          <p:cNvPr id="36" name="PlaceHolder 7"/>
-          <p:cNvSpPr>
-            <a:spLocks noGrp="1"/>
-          </p:cNvSpPr>
-          <p:nvPr>
-            <p:ph type="body"/>
-          </p:nvPr>
-        </p:nvSpPr>
-        <p:spPr>
-          <a:xfrm>
-            <a:off x="6639120" y="3044520"/>
-            <a:ext cx="2921040" cy="1568520"/>
-          </a:xfrm>
-          <a:prstGeom prst="rect">
-            <a:avLst/>
-          </a:prstGeom>
-        </p:spPr>
-        <p:txBody>
-          <a:bodyPr lIns="0" rIns="0" tIns="0" bIns="0">
-            <a:normAutofit/>
-          </a:bodyPr>
-          <a:p>
-            <a:endParaRPr b="0" lang="de-DE" sz="3200" spc="-1" strike="noStrike">
+            <a:pPr algn="ctr">
+              <a:buNone/>
+            </a:pPr>
+            <a:endParaRPr b="0" lang="de-DE" sz="7819" spc="-1" strike="noStrike">
+              <a:latin typeface="Arial"/>
+            </a:endParaRPr>
+          </a:p>
+        </p:txBody>
+      </p:sp>
+      <p:sp>
+        <p:nvSpPr>
+          <p:cNvPr id="32" name="PlaceHolder 2"/>
+          <p:cNvSpPr>
+            <a:spLocks noGrp="1"/>
+          </p:cNvSpPr>
+          <p:nvPr>
+            <p:ph/>
+          </p:nvPr>
+        </p:nvSpPr>
+        <p:spPr>
+          <a:xfrm>
+            <a:off x="283320" y="2358000"/>
+            <a:ext cx="1642680" cy="2787840"/>
+          </a:xfrm>
+          <a:prstGeom prst="rect">
+            <a:avLst/>
+          </a:prstGeom>
+          <a:noFill/>
+          <a:ln w="0">
+            <a:noFill/>
+          </a:ln>
+        </p:spPr>
+        <p:txBody>
+          <a:bodyPr lIns="0" rIns="0" tIns="0" bIns="0" anchor="t">
+            <a:normAutofit fontScale="85000"/>
+          </a:bodyPr>
+          <a:p>
+            <a:endParaRPr b="0" lang="de-DE" sz="5690" spc="-1" strike="noStrike">
+              <a:latin typeface="Arial"/>
+            </a:endParaRPr>
+          </a:p>
+        </p:txBody>
+      </p:sp>
+      <p:sp>
+        <p:nvSpPr>
+          <p:cNvPr id="33" name="PlaceHolder 3"/>
+          <p:cNvSpPr>
+            <a:spLocks noGrp="1"/>
+          </p:cNvSpPr>
+          <p:nvPr>
+            <p:ph/>
+          </p:nvPr>
+        </p:nvSpPr>
+        <p:spPr>
+          <a:xfrm>
+            <a:off x="2008440" y="2358000"/>
+            <a:ext cx="1642680" cy="2787840"/>
+          </a:xfrm>
+          <a:prstGeom prst="rect">
+            <a:avLst/>
+          </a:prstGeom>
+          <a:noFill/>
+          <a:ln w="0">
+            <a:noFill/>
+          </a:ln>
+        </p:spPr>
+        <p:txBody>
+          <a:bodyPr lIns="0" rIns="0" tIns="0" bIns="0" anchor="t">
+            <a:normAutofit fontScale="85000"/>
+          </a:bodyPr>
+          <a:p>
+            <a:endParaRPr b="0" lang="de-DE" sz="5690" spc="-1" strike="noStrike">
+              <a:latin typeface="Arial"/>
+            </a:endParaRPr>
+          </a:p>
+        </p:txBody>
+      </p:sp>
+      <p:sp>
+        <p:nvSpPr>
+          <p:cNvPr id="34" name="PlaceHolder 4"/>
+          <p:cNvSpPr>
+            <a:spLocks noGrp="1"/>
+          </p:cNvSpPr>
+          <p:nvPr>
+            <p:ph/>
+          </p:nvPr>
+        </p:nvSpPr>
+        <p:spPr>
+          <a:xfrm>
+            <a:off x="3733560" y="2358000"/>
+            <a:ext cx="1642680" cy="2787840"/>
+          </a:xfrm>
+          <a:prstGeom prst="rect">
+            <a:avLst/>
+          </a:prstGeom>
+          <a:noFill/>
+          <a:ln w="0">
+            <a:noFill/>
+          </a:ln>
+        </p:spPr>
+        <p:txBody>
+          <a:bodyPr lIns="0" rIns="0" tIns="0" bIns="0" anchor="t">
+            <a:normAutofit fontScale="85000"/>
+          </a:bodyPr>
+          <a:p>
+            <a:endParaRPr b="0" lang="de-DE" sz="5690" spc="-1" strike="noStrike">
+              <a:latin typeface="Arial"/>
+            </a:endParaRPr>
+          </a:p>
+        </p:txBody>
+      </p:sp>
+      <p:sp>
+        <p:nvSpPr>
+          <p:cNvPr id="35" name="PlaceHolder 5"/>
+          <p:cNvSpPr>
+            <a:spLocks noGrp="1"/>
+          </p:cNvSpPr>
+          <p:nvPr>
+            <p:ph/>
+          </p:nvPr>
+        </p:nvSpPr>
+        <p:spPr>
+          <a:xfrm>
+            <a:off x="283320" y="5411160"/>
+            <a:ext cx="1642680" cy="2787840"/>
+          </a:xfrm>
+          <a:prstGeom prst="rect">
+            <a:avLst/>
+          </a:prstGeom>
+          <a:noFill/>
+          <a:ln w="0">
+            <a:noFill/>
+          </a:ln>
+        </p:spPr>
+        <p:txBody>
+          <a:bodyPr lIns="0" rIns="0" tIns="0" bIns="0" anchor="t">
+            <a:normAutofit fontScale="85000"/>
+          </a:bodyPr>
+          <a:p>
+            <a:endParaRPr b="0" lang="de-DE" sz="5690" spc="-1" strike="noStrike">
+              <a:latin typeface="Arial"/>
+            </a:endParaRPr>
+          </a:p>
+        </p:txBody>
+      </p:sp>
+      <p:sp>
+        <p:nvSpPr>
+          <p:cNvPr id="36" name="PlaceHolder 6"/>
+          <p:cNvSpPr>
+            <a:spLocks noGrp="1"/>
+          </p:cNvSpPr>
+          <p:nvPr>
+            <p:ph/>
+          </p:nvPr>
+        </p:nvSpPr>
+        <p:spPr>
+          <a:xfrm>
+            <a:off x="2008440" y="5411160"/>
+            <a:ext cx="1642680" cy="2787840"/>
+          </a:xfrm>
+          <a:prstGeom prst="rect">
+            <a:avLst/>
+          </a:prstGeom>
+          <a:noFill/>
+          <a:ln w="0">
+            <a:noFill/>
+          </a:ln>
+        </p:spPr>
+        <p:txBody>
+          <a:bodyPr lIns="0" rIns="0" tIns="0" bIns="0" anchor="t">
+            <a:normAutofit fontScale="85000"/>
+          </a:bodyPr>
+          <a:p>
+            <a:endParaRPr b="0" lang="de-DE" sz="5690" spc="-1" strike="noStrike">
+              <a:latin typeface="Arial"/>
+            </a:endParaRPr>
+          </a:p>
+        </p:txBody>
+      </p:sp>
+      <p:sp>
+        <p:nvSpPr>
+          <p:cNvPr id="37" name="PlaceHolder 7"/>
+          <p:cNvSpPr>
+            <a:spLocks noGrp="1"/>
+          </p:cNvSpPr>
+          <p:nvPr>
+            <p:ph/>
+          </p:nvPr>
+        </p:nvSpPr>
+        <p:spPr>
+          <a:xfrm>
+            <a:off x="3733560" y="5411160"/>
+            <a:ext cx="1642680" cy="2787840"/>
+          </a:xfrm>
+          <a:prstGeom prst="rect">
+            <a:avLst/>
+          </a:prstGeom>
+          <a:noFill/>
+          <a:ln w="0">
+            <a:noFill/>
+          </a:ln>
+        </p:spPr>
+        <p:txBody>
+          <a:bodyPr lIns="0" rIns="0" tIns="0" bIns="0" anchor="t">
+            <a:normAutofit fontScale="85000"/>
+          </a:bodyPr>
+          <a:p>
+            <a:endParaRPr b="0" lang="de-DE" sz="5690" spc="-1" strike="noStrike">
               <a:latin typeface="Arial"/>
             </a:endParaRPr>
           </a:p>
@@ -572,7 +638,7 @@
       </p:grpSpPr>
       <p:sp>
         <p:nvSpPr>
-          <p:cNvPr id="1" name="PlaceHolder 1"/>
+          <p:cNvPr id="2" name="PlaceHolder 1"/>
           <p:cNvSpPr>
             <a:spLocks noGrp="1"/>
           </p:cNvSpPr>
@@ -582,28 +648,34 @@
         </p:nvSpPr>
         <p:spPr>
           <a:xfrm>
-            <a:off x="504000" y="226080"/>
-            <a:ext cx="9071280" cy="946080"/>
-          </a:xfrm>
-          <a:prstGeom prst="rect">
-            <a:avLst/>
-          </a:prstGeom>
+            <a:off x="283320" y="134280"/>
+            <a:ext cx="5101920" cy="2216520"/>
+          </a:xfrm>
+          <a:prstGeom prst="rect">
+            <a:avLst/>
+          </a:prstGeom>
+          <a:noFill/>
+          <a:ln w="0">
+            <a:noFill/>
+          </a:ln>
         </p:spPr>
         <p:txBody>
           <a:bodyPr lIns="0" rIns="0" tIns="0" bIns="0" anchor="ctr">
             <a:noAutofit/>
           </a:bodyPr>
           <a:p>
-            <a:pPr algn="ctr"/>
-            <a:endParaRPr b="0" lang="de-DE" sz="4400" spc="-1" strike="noStrike">
-              <a:latin typeface="Arial"/>
-            </a:endParaRPr>
-          </a:p>
-        </p:txBody>
-      </p:sp>
-      <p:sp>
-        <p:nvSpPr>
-          <p:cNvPr id="2" name="PlaceHolder 2"/>
+            <a:pPr algn="ctr">
+              <a:buNone/>
+            </a:pPr>
+            <a:endParaRPr b="0" lang="de-DE" sz="7819" spc="-1" strike="noStrike">
+              <a:latin typeface="Arial"/>
+            </a:endParaRPr>
+          </a:p>
+        </p:txBody>
+      </p:sp>
+      <p:sp>
+        <p:nvSpPr>
+          <p:cNvPr id="3" name="PlaceHolder 2"/>
           <p:cNvSpPr>
             <a:spLocks noGrp="1"/>
           </p:cNvSpPr>
@@ -613,19 +685,25 @@
         </p:nvSpPr>
         <p:spPr>
           <a:xfrm>
-            <a:off x="504000" y="1326600"/>
-            <a:ext cx="9072000" cy="3288600"/>
-          </a:xfrm>
-          <a:prstGeom prst="rect">
-            <a:avLst/>
-          </a:prstGeom>
+            <a:off x="283320" y="2358000"/>
+            <a:ext cx="5102280" cy="5844960"/>
+          </a:xfrm>
+          <a:prstGeom prst="rect">
+            <a:avLst/>
+          </a:prstGeom>
+          <a:noFill/>
+          <a:ln w="0">
+            <a:noFill/>
+          </a:ln>
         </p:spPr>
         <p:txBody>
           <a:bodyPr lIns="0" rIns="0" tIns="0" bIns="0" anchor="ctr">
             <a:noAutofit/>
           </a:bodyPr>
           <a:p>
-            <a:pPr algn="ctr"/>
+            <a:pPr algn="ctr">
+              <a:buNone/>
+            </a:pPr>
             <a:endParaRPr b="0" lang="de-DE" sz="3200" spc="-1" strike="noStrike">
               <a:latin typeface="Arial"/>
             </a:endParaRPr>
@@ -656,7 +734,7 @@
       </p:grpSpPr>
       <p:sp>
         <p:nvSpPr>
-          <p:cNvPr id="3" name="PlaceHolder 1"/>
+          <p:cNvPr id="4" name="PlaceHolder 1"/>
           <p:cNvSpPr>
             <a:spLocks noGrp="1"/>
           </p:cNvSpPr>
@@ -666,50 +744,60 @@
         </p:nvSpPr>
         <p:spPr>
           <a:xfrm>
-            <a:off x="504000" y="226080"/>
-            <a:ext cx="9071280" cy="946080"/>
-          </a:xfrm>
-          <a:prstGeom prst="rect">
-            <a:avLst/>
-          </a:prstGeom>
+            <a:off x="283320" y="134280"/>
+            <a:ext cx="5101920" cy="2216520"/>
+          </a:xfrm>
+          <a:prstGeom prst="rect">
+            <a:avLst/>
+          </a:prstGeom>
+          <a:noFill/>
+          <a:ln w="0">
+            <a:noFill/>
+          </a:ln>
         </p:spPr>
         <p:txBody>
           <a:bodyPr lIns="0" rIns="0" tIns="0" bIns="0" anchor="ctr">
             <a:noAutofit/>
           </a:bodyPr>
           <a:p>
-            <a:pPr algn="ctr"/>
-            <a:endParaRPr b="0" lang="de-DE" sz="4400" spc="-1" strike="noStrike">
-              <a:latin typeface="Arial"/>
-            </a:endParaRPr>
-          </a:p>
-        </p:txBody>
-      </p:sp>
-      <p:sp>
-        <p:nvSpPr>
-          <p:cNvPr id="4" name="PlaceHolder 2"/>
-          <p:cNvSpPr>
-            <a:spLocks noGrp="1"/>
-          </p:cNvSpPr>
-          <p:nvPr>
-            <p:ph type="body"/>
-          </p:nvPr>
-        </p:nvSpPr>
-        <p:spPr>
-          <a:xfrm>
-            <a:off x="504000" y="1326600"/>
-            <a:ext cx="9072000" cy="3288600"/>
-          </a:xfrm>
-          <a:prstGeom prst="rect">
-            <a:avLst/>
-          </a:prstGeom>
-        </p:spPr>
-        <p:txBody>
-          <a:bodyPr lIns="0" rIns="0" tIns="0" bIns="0">
+            <a:pPr algn="ctr">
+              <a:buNone/>
+            </a:pPr>
+            <a:endParaRPr b="0" lang="de-DE" sz="7819" spc="-1" strike="noStrike">
+              <a:latin typeface="Arial"/>
+            </a:endParaRPr>
+          </a:p>
+        </p:txBody>
+      </p:sp>
+      <p:sp>
+        <p:nvSpPr>
+          <p:cNvPr id="5" name="PlaceHolder 2"/>
+          <p:cNvSpPr>
+            <a:spLocks noGrp="1"/>
+          </p:cNvSpPr>
+          <p:nvPr>
+            <p:ph/>
+          </p:nvPr>
+        </p:nvSpPr>
+        <p:spPr>
+          <a:xfrm>
+            <a:off x="283320" y="2358000"/>
+            <a:ext cx="5102280" cy="5844960"/>
+          </a:xfrm>
+          <a:prstGeom prst="rect">
+            <a:avLst/>
+          </a:prstGeom>
+          <a:noFill/>
+          <a:ln w="0">
+            <a:noFill/>
+          </a:ln>
+        </p:spPr>
+        <p:txBody>
+          <a:bodyPr lIns="0" rIns="0" tIns="0" bIns="0" anchor="t">
             <a:normAutofit/>
           </a:bodyPr>
           <a:p>
-            <a:endParaRPr b="0" lang="de-DE" sz="3200" spc="-1" strike="noStrike">
+            <a:endParaRPr b="0" lang="de-DE" sz="5690" spc="-1" strike="noStrike">
               <a:latin typeface="Arial"/>
             </a:endParaRPr>
           </a:p>
@@ -739,7 +827,7 @@
       </p:grpSpPr>
       <p:sp>
         <p:nvSpPr>
-          <p:cNvPr id="5" name="PlaceHolder 1"/>
+          <p:cNvPr id="6" name="PlaceHolder 1"/>
           <p:cNvSpPr>
             <a:spLocks noGrp="1"/>
           </p:cNvSpPr>
@@ -749,80 +837,94 @@
         </p:nvSpPr>
         <p:spPr>
           <a:xfrm>
-            <a:off x="504000" y="226080"/>
-            <a:ext cx="9071280" cy="946080"/>
-          </a:xfrm>
-          <a:prstGeom prst="rect">
-            <a:avLst/>
-          </a:prstGeom>
+            <a:off x="283320" y="134280"/>
+            <a:ext cx="5101920" cy="2216520"/>
+          </a:xfrm>
+          <a:prstGeom prst="rect">
+            <a:avLst/>
+          </a:prstGeom>
+          <a:noFill/>
+          <a:ln w="0">
+            <a:noFill/>
+          </a:ln>
         </p:spPr>
         <p:txBody>
           <a:bodyPr lIns="0" rIns="0" tIns="0" bIns="0" anchor="ctr">
             <a:noAutofit/>
           </a:bodyPr>
           <a:p>
-            <a:pPr algn="ctr"/>
-            <a:endParaRPr b="0" lang="de-DE" sz="4400" spc="-1" strike="noStrike">
-              <a:latin typeface="Arial"/>
-            </a:endParaRPr>
-          </a:p>
-        </p:txBody>
-      </p:sp>
-      <p:sp>
-        <p:nvSpPr>
-          <p:cNvPr id="6" name="PlaceHolder 2"/>
-          <p:cNvSpPr>
-            <a:spLocks noGrp="1"/>
-          </p:cNvSpPr>
-          <p:nvPr>
-            <p:ph type="body"/>
-          </p:nvPr>
-        </p:nvSpPr>
-        <p:spPr>
-          <a:xfrm>
-            <a:off x="504000" y="1326600"/>
-            <a:ext cx="4426920" cy="3288600"/>
-          </a:xfrm>
-          <a:prstGeom prst="rect">
-            <a:avLst/>
-          </a:prstGeom>
-        </p:spPr>
-        <p:txBody>
-          <a:bodyPr lIns="0" rIns="0" tIns="0" bIns="0">
+            <a:pPr algn="ctr">
+              <a:buNone/>
+            </a:pPr>
+            <a:endParaRPr b="0" lang="de-DE" sz="7819" spc="-1" strike="noStrike">
+              <a:latin typeface="Arial"/>
+            </a:endParaRPr>
+          </a:p>
+        </p:txBody>
+      </p:sp>
+      <p:sp>
+        <p:nvSpPr>
+          <p:cNvPr id="7" name="PlaceHolder 2"/>
+          <p:cNvSpPr>
+            <a:spLocks noGrp="1"/>
+          </p:cNvSpPr>
+          <p:nvPr>
+            <p:ph/>
+          </p:nvPr>
+        </p:nvSpPr>
+        <p:spPr>
+          <a:xfrm>
+            <a:off x="283320" y="2358000"/>
+            <a:ext cx="2489760" cy="5844960"/>
+          </a:xfrm>
+          <a:prstGeom prst="rect">
+            <a:avLst/>
+          </a:prstGeom>
+          <a:noFill/>
+          <a:ln w="0">
+            <a:noFill/>
+          </a:ln>
+        </p:spPr>
+        <p:txBody>
+          <a:bodyPr lIns="0" rIns="0" tIns="0" bIns="0" anchor="t">
             <a:normAutofit/>
           </a:bodyPr>
           <a:p>
-            <a:endParaRPr b="0" lang="de-DE" sz="3200" spc="-1" strike="noStrike">
-              <a:latin typeface="Arial"/>
-            </a:endParaRPr>
-          </a:p>
-        </p:txBody>
-      </p:sp>
-      <p:sp>
-        <p:nvSpPr>
-          <p:cNvPr id="7" name="PlaceHolder 3"/>
-          <p:cNvSpPr>
-            <a:spLocks noGrp="1"/>
-          </p:cNvSpPr>
-          <p:nvPr>
-            <p:ph type="body"/>
-          </p:nvPr>
-        </p:nvSpPr>
-        <p:spPr>
-          <a:xfrm>
-            <a:off x="5152680" y="1326600"/>
-            <a:ext cx="4426920" cy="3288600"/>
-          </a:xfrm>
-          <a:prstGeom prst="rect">
-            <a:avLst/>
-          </a:prstGeom>
-        </p:spPr>
-        <p:txBody>
-          <a:bodyPr lIns="0" rIns="0" tIns="0" bIns="0">
+            <a:endParaRPr b="0" lang="de-DE" sz="5690" spc="-1" strike="noStrike">
+              <a:latin typeface="Arial"/>
+            </a:endParaRPr>
+          </a:p>
+        </p:txBody>
+      </p:sp>
+      <p:sp>
+        <p:nvSpPr>
+          <p:cNvPr id="8" name="PlaceHolder 3"/>
+          <p:cNvSpPr>
+            <a:spLocks noGrp="1"/>
+          </p:cNvSpPr>
+          <p:nvPr>
+            <p:ph/>
+          </p:nvPr>
+        </p:nvSpPr>
+        <p:spPr>
+          <a:xfrm>
+            <a:off x="2898000" y="2358000"/>
+            <a:ext cx="2489760" cy="5844960"/>
+          </a:xfrm>
+          <a:prstGeom prst="rect">
+            <a:avLst/>
+          </a:prstGeom>
+          <a:noFill/>
+          <a:ln w="0">
+            <a:noFill/>
+          </a:ln>
+        </p:spPr>
+        <p:txBody>
+          <a:bodyPr lIns="0" rIns="0" tIns="0" bIns="0" anchor="t">
             <a:normAutofit/>
           </a:bodyPr>
           <a:p>
-            <a:endParaRPr b="0" lang="de-DE" sz="3200" spc="-1" strike="noStrike">
+            <a:endParaRPr b="0" lang="de-DE" sz="5690" spc="-1" strike="noStrike">
               <a:latin typeface="Arial"/>
             </a:endParaRPr>
           </a:p>
@@ -852,7 +954,7 @@
       </p:grpSpPr>
       <p:sp>
         <p:nvSpPr>
-          <p:cNvPr id="8" name="PlaceHolder 1"/>
+          <p:cNvPr id="9" name="PlaceHolder 1"/>
           <p:cNvSpPr>
             <a:spLocks noGrp="1"/>
           </p:cNvSpPr>
@@ -862,20 +964,26 @@
         </p:nvSpPr>
         <p:spPr>
           <a:xfrm>
-            <a:off x="504000" y="226080"/>
-            <a:ext cx="9071280" cy="946080"/>
-          </a:xfrm>
-          <a:prstGeom prst="rect">
-            <a:avLst/>
-          </a:prstGeom>
+            <a:off x="283320" y="134280"/>
+            <a:ext cx="5101920" cy="2216520"/>
+          </a:xfrm>
+          <a:prstGeom prst="rect">
+            <a:avLst/>
+          </a:prstGeom>
+          <a:noFill/>
+          <a:ln w="0">
+            <a:noFill/>
+          </a:ln>
         </p:spPr>
         <p:txBody>
           <a:bodyPr lIns="0" rIns="0" tIns="0" bIns="0" anchor="ctr">
             <a:noAutofit/>
           </a:bodyPr>
           <a:p>
-            <a:pPr algn="ctr"/>
-            <a:endParaRPr b="0" lang="de-DE" sz="4400" spc="-1" strike="noStrike">
+            <a:pPr algn="ctr">
+              <a:buNone/>
+            </a:pPr>
+            <a:endParaRPr b="0" lang="de-DE" sz="7819" spc="-1" strike="noStrike">
               <a:latin typeface="Arial"/>
             </a:endParaRPr>
           </a:p>
@@ -905,7 +1013,7 @@
       </p:grpSpPr>
       <p:sp>
         <p:nvSpPr>
-          <p:cNvPr id="9" name="PlaceHolder 1"/>
+          <p:cNvPr id="10" name="PlaceHolder 1"/>
           <p:cNvSpPr>
             <a:spLocks noGrp="1"/>
           </p:cNvSpPr>
@@ -915,19 +1023,25 @@
         </p:nvSpPr>
         <p:spPr>
           <a:xfrm>
-            <a:off x="504000" y="226080"/>
-            <a:ext cx="9071280" cy="4386600"/>
-          </a:xfrm>
-          <a:prstGeom prst="rect">
-            <a:avLst/>
-          </a:prstGeom>
+            <a:off x="283320" y="401760"/>
+            <a:ext cx="5101920" cy="7794360"/>
+          </a:xfrm>
+          <a:prstGeom prst="rect">
+            <a:avLst/>
+          </a:prstGeom>
+          <a:noFill/>
+          <a:ln w="0">
+            <a:noFill/>
+          </a:ln>
         </p:spPr>
         <p:txBody>
           <a:bodyPr lIns="0" rIns="0" tIns="0" bIns="0" anchor="ctr">
             <a:noAutofit/>
           </a:bodyPr>
           <a:p>
-            <a:pPr algn="ctr"/>
+            <a:pPr algn="ctr">
+              <a:buNone/>
+            </a:pPr>
             <a:endParaRPr b="0" lang="de-DE" sz="3200" spc="-1" strike="noStrike">
               <a:latin typeface="Arial"/>
             </a:endParaRPr>
@@ -958,7 +1072,7 @@
       </p:grpSpPr>
       <p:sp>
         <p:nvSpPr>
-          <p:cNvPr id="10" name="PlaceHolder 1"/>
+          <p:cNvPr id="11" name="PlaceHolder 1"/>
           <p:cNvSpPr>
             <a:spLocks noGrp="1"/>
           </p:cNvSpPr>
@@ -968,110 +1082,128 @@
         </p:nvSpPr>
         <p:spPr>
           <a:xfrm>
-            <a:off x="504000" y="226080"/>
-            <a:ext cx="9071280" cy="946080"/>
-          </a:xfrm>
-          <a:prstGeom prst="rect">
-            <a:avLst/>
-          </a:prstGeom>
+            <a:off x="283320" y="134280"/>
+            <a:ext cx="5101920" cy="2216520"/>
+          </a:xfrm>
+          <a:prstGeom prst="rect">
+            <a:avLst/>
+          </a:prstGeom>
+          <a:noFill/>
+          <a:ln w="0">
+            <a:noFill/>
+          </a:ln>
         </p:spPr>
         <p:txBody>
           <a:bodyPr lIns="0" rIns="0" tIns="0" bIns="0" anchor="ctr">
             <a:noAutofit/>
           </a:bodyPr>
           <a:p>
-            <a:pPr algn="ctr"/>
-            <a:endParaRPr b="0" lang="de-DE" sz="4400" spc="-1" strike="noStrike">
-              <a:latin typeface="Arial"/>
-            </a:endParaRPr>
-          </a:p>
-        </p:txBody>
-      </p:sp>
-      <p:sp>
-        <p:nvSpPr>
-          <p:cNvPr id="11" name="PlaceHolder 2"/>
-          <p:cNvSpPr>
-            <a:spLocks noGrp="1"/>
-          </p:cNvSpPr>
-          <p:nvPr>
-            <p:ph type="body"/>
-          </p:nvPr>
-        </p:nvSpPr>
-        <p:spPr>
-          <a:xfrm>
-            <a:off x="504000" y="1326600"/>
-            <a:ext cx="4426920" cy="1568520"/>
-          </a:xfrm>
-          <a:prstGeom prst="rect">
-            <a:avLst/>
-          </a:prstGeom>
-        </p:spPr>
-        <p:txBody>
-          <a:bodyPr lIns="0" rIns="0" tIns="0" bIns="0">
+            <a:pPr algn="ctr">
+              <a:buNone/>
+            </a:pPr>
+            <a:endParaRPr b="0" lang="de-DE" sz="7819" spc="-1" strike="noStrike">
+              <a:latin typeface="Arial"/>
+            </a:endParaRPr>
+          </a:p>
+        </p:txBody>
+      </p:sp>
+      <p:sp>
+        <p:nvSpPr>
+          <p:cNvPr id="12" name="PlaceHolder 2"/>
+          <p:cNvSpPr>
+            <a:spLocks noGrp="1"/>
+          </p:cNvSpPr>
+          <p:nvPr>
+            <p:ph/>
+          </p:nvPr>
+        </p:nvSpPr>
+        <p:spPr>
+          <a:xfrm>
+            <a:off x="283320" y="2358000"/>
+            <a:ext cx="2489760" cy="2787840"/>
+          </a:xfrm>
+          <a:prstGeom prst="rect">
+            <a:avLst/>
+          </a:prstGeom>
+          <a:noFill/>
+          <a:ln w="0">
+            <a:noFill/>
+          </a:ln>
+        </p:spPr>
+        <p:txBody>
+          <a:bodyPr lIns="0" rIns="0" tIns="0" bIns="0" anchor="t">
             <a:normAutofit/>
           </a:bodyPr>
           <a:p>
-            <a:endParaRPr b="0" lang="de-DE" sz="3200" spc="-1" strike="noStrike">
-              <a:latin typeface="Arial"/>
-            </a:endParaRPr>
-          </a:p>
-        </p:txBody>
-      </p:sp>
-      <p:sp>
-        <p:nvSpPr>
-          <p:cNvPr id="12" name="PlaceHolder 3"/>
-          <p:cNvSpPr>
-            <a:spLocks noGrp="1"/>
-          </p:cNvSpPr>
-          <p:nvPr>
-            <p:ph type="body"/>
-          </p:nvPr>
-        </p:nvSpPr>
-        <p:spPr>
-          <a:xfrm>
-            <a:off x="5152680" y="1326600"/>
-            <a:ext cx="4426920" cy="3288600"/>
-          </a:xfrm>
-          <a:prstGeom prst="rect">
-            <a:avLst/>
-          </a:prstGeom>
-        </p:spPr>
-        <p:txBody>
-          <a:bodyPr lIns="0" rIns="0" tIns="0" bIns="0">
+            <a:endParaRPr b="0" lang="de-DE" sz="5690" spc="-1" strike="noStrike">
+              <a:latin typeface="Arial"/>
+            </a:endParaRPr>
+          </a:p>
+        </p:txBody>
+      </p:sp>
+      <p:sp>
+        <p:nvSpPr>
+          <p:cNvPr id="13" name="PlaceHolder 3"/>
+          <p:cNvSpPr>
+            <a:spLocks noGrp="1"/>
+          </p:cNvSpPr>
+          <p:nvPr>
+            <p:ph/>
+          </p:nvPr>
+        </p:nvSpPr>
+        <p:spPr>
+          <a:xfrm>
+            <a:off x="2898000" y="2358000"/>
+            <a:ext cx="2489760" cy="5844960"/>
+          </a:xfrm>
+          <a:prstGeom prst="rect">
+            <a:avLst/>
+          </a:prstGeom>
+          <a:noFill/>
+          <a:ln w="0">
+            <a:noFill/>
+          </a:ln>
+        </p:spPr>
+        <p:txBody>
+          <a:bodyPr lIns="0" rIns="0" tIns="0" bIns="0" anchor="t">
             <a:normAutofit/>
           </a:bodyPr>
           <a:p>
-            <a:endParaRPr b="0" lang="de-DE" sz="3200" spc="-1" strike="noStrike">
-              <a:latin typeface="Arial"/>
-            </a:endParaRPr>
-          </a:p>
-        </p:txBody>
-      </p:sp>
-      <p:sp>
-        <p:nvSpPr>
-          <p:cNvPr id="13" name="PlaceHolder 4"/>
-          <p:cNvSpPr>
-            <a:spLocks noGrp="1"/>
-          </p:cNvSpPr>
-          <p:nvPr>
-            <p:ph type="body"/>
-          </p:nvPr>
-        </p:nvSpPr>
-        <p:spPr>
-          <a:xfrm>
-            <a:off x="504000" y="3044520"/>
-            <a:ext cx="4426920" cy="1568520"/>
-          </a:xfrm>
-          <a:prstGeom prst="rect">
-            <a:avLst/>
-          </a:prstGeom>
-        </p:spPr>
-        <p:txBody>
-          <a:bodyPr lIns="0" rIns="0" tIns="0" bIns="0">
+            <a:endParaRPr b="0" lang="de-DE" sz="5690" spc="-1" strike="noStrike">
+              <a:latin typeface="Arial"/>
+            </a:endParaRPr>
+          </a:p>
+        </p:txBody>
+      </p:sp>
+      <p:sp>
+        <p:nvSpPr>
+          <p:cNvPr id="14" name="PlaceHolder 4"/>
+          <p:cNvSpPr>
+            <a:spLocks noGrp="1"/>
+          </p:cNvSpPr>
+          <p:nvPr>
+            <p:ph/>
+          </p:nvPr>
+        </p:nvSpPr>
+        <p:spPr>
+          <a:xfrm>
+            <a:off x="283320" y="5411160"/>
+            <a:ext cx="2489760" cy="2787840"/>
+          </a:xfrm>
+          <a:prstGeom prst="rect">
+            <a:avLst/>
+          </a:prstGeom>
+          <a:noFill/>
+          <a:ln w="0">
+            <a:noFill/>
+          </a:ln>
+        </p:spPr>
+        <p:txBody>
+          <a:bodyPr lIns="0" rIns="0" tIns="0" bIns="0" anchor="t">
             <a:normAutofit/>
           </a:bodyPr>
           <a:p>
-            <a:endParaRPr b="0" lang="de-DE" sz="3200" spc="-1" strike="noStrike">
+            <a:endParaRPr b="0" lang="de-DE" sz="5690" spc="-1" strike="noStrike">
               <a:latin typeface="Arial"/>
             </a:endParaRPr>
           </a:p>
@@ -1101,7 +1233,7 @@
       </p:grpSpPr>
       <p:sp>
         <p:nvSpPr>
-          <p:cNvPr id="14" name="PlaceHolder 1"/>
+          <p:cNvPr id="15" name="PlaceHolder 1"/>
           <p:cNvSpPr>
             <a:spLocks noGrp="1"/>
           </p:cNvSpPr>
@@ -1111,110 +1243,128 @@
         </p:nvSpPr>
         <p:spPr>
           <a:xfrm>
-            <a:off x="504000" y="226080"/>
-            <a:ext cx="9071280" cy="946080"/>
-          </a:xfrm>
-          <a:prstGeom prst="rect">
-            <a:avLst/>
-          </a:prstGeom>
+            <a:off x="283320" y="134280"/>
+            <a:ext cx="5101920" cy="2216520"/>
+          </a:xfrm>
+          <a:prstGeom prst="rect">
+            <a:avLst/>
+          </a:prstGeom>
+          <a:noFill/>
+          <a:ln w="0">
+            <a:noFill/>
+          </a:ln>
         </p:spPr>
         <p:txBody>
           <a:bodyPr lIns="0" rIns="0" tIns="0" bIns="0" anchor="ctr">
             <a:noAutofit/>
           </a:bodyPr>
           <a:p>
-            <a:pPr algn="ctr"/>
-            <a:endParaRPr b="0" lang="de-DE" sz="4400" spc="-1" strike="noStrike">
-              <a:latin typeface="Arial"/>
-            </a:endParaRPr>
-          </a:p>
-        </p:txBody>
-      </p:sp>
-      <p:sp>
-        <p:nvSpPr>
-          <p:cNvPr id="15" name="PlaceHolder 2"/>
-          <p:cNvSpPr>
-            <a:spLocks noGrp="1"/>
-          </p:cNvSpPr>
-          <p:nvPr>
-            <p:ph type="body"/>
-          </p:nvPr>
-        </p:nvSpPr>
-        <p:spPr>
-          <a:xfrm>
-            <a:off x="504000" y="1326600"/>
-            <a:ext cx="4426920" cy="3288600"/>
-          </a:xfrm>
-          <a:prstGeom prst="rect">
-            <a:avLst/>
-          </a:prstGeom>
-        </p:spPr>
-        <p:txBody>
-          <a:bodyPr lIns="0" rIns="0" tIns="0" bIns="0">
+            <a:pPr algn="ctr">
+              <a:buNone/>
+            </a:pPr>
+            <a:endParaRPr b="0" lang="de-DE" sz="7819" spc="-1" strike="noStrike">
+              <a:latin typeface="Arial"/>
+            </a:endParaRPr>
+          </a:p>
+        </p:txBody>
+      </p:sp>
+      <p:sp>
+        <p:nvSpPr>
+          <p:cNvPr id="16" name="PlaceHolder 2"/>
+          <p:cNvSpPr>
+            <a:spLocks noGrp="1"/>
+          </p:cNvSpPr>
+          <p:nvPr>
+            <p:ph/>
+          </p:nvPr>
+        </p:nvSpPr>
+        <p:spPr>
+          <a:xfrm>
+            <a:off x="283320" y="2358000"/>
+            <a:ext cx="2489760" cy="5844960"/>
+          </a:xfrm>
+          <a:prstGeom prst="rect">
+            <a:avLst/>
+          </a:prstGeom>
+          <a:noFill/>
+          <a:ln w="0">
+            <a:noFill/>
+          </a:ln>
+        </p:spPr>
+        <p:txBody>
+          <a:bodyPr lIns="0" rIns="0" tIns="0" bIns="0" anchor="t">
             <a:normAutofit/>
           </a:bodyPr>
           <a:p>
-            <a:endParaRPr b="0" lang="de-DE" sz="3200" spc="-1" strike="noStrike">
-              <a:latin typeface="Arial"/>
-            </a:endParaRPr>
-          </a:p>
-        </p:txBody>
-      </p:sp>
-      <p:sp>
-        <p:nvSpPr>
-          <p:cNvPr id="16" name="PlaceHolder 3"/>
-          <p:cNvSpPr>
-            <a:spLocks noGrp="1"/>
-          </p:cNvSpPr>
-          <p:nvPr>
-            <p:ph type="body"/>
-          </p:nvPr>
-        </p:nvSpPr>
-        <p:spPr>
-          <a:xfrm>
-            <a:off x="5152680" y="1326600"/>
-            <a:ext cx="4426920" cy="1568520"/>
-          </a:xfrm>
-          <a:prstGeom prst="rect">
-            <a:avLst/>
-          </a:prstGeom>
-        </p:spPr>
-        <p:txBody>
-          <a:bodyPr lIns="0" rIns="0" tIns="0" bIns="0">
+            <a:endParaRPr b="0" lang="de-DE" sz="5690" spc="-1" strike="noStrike">
+              <a:latin typeface="Arial"/>
+            </a:endParaRPr>
+          </a:p>
+        </p:txBody>
+      </p:sp>
+      <p:sp>
+        <p:nvSpPr>
+          <p:cNvPr id="17" name="PlaceHolder 3"/>
+          <p:cNvSpPr>
+            <a:spLocks noGrp="1"/>
+          </p:cNvSpPr>
+          <p:nvPr>
+            <p:ph/>
+          </p:nvPr>
+        </p:nvSpPr>
+        <p:spPr>
+          <a:xfrm>
+            <a:off x="2898000" y="2358000"/>
+            <a:ext cx="2489760" cy="2787840"/>
+          </a:xfrm>
+          <a:prstGeom prst="rect">
+            <a:avLst/>
+          </a:prstGeom>
+          <a:noFill/>
+          <a:ln w="0">
+            <a:noFill/>
+          </a:ln>
+        </p:spPr>
+        <p:txBody>
+          <a:bodyPr lIns="0" rIns="0" tIns="0" bIns="0" anchor="t">
             <a:normAutofit/>
           </a:bodyPr>
           <a:p>
-            <a:endParaRPr b="0" lang="de-DE" sz="3200" spc="-1" strike="noStrike">
-              <a:latin typeface="Arial"/>
-            </a:endParaRPr>
-          </a:p>
-        </p:txBody>
-      </p:sp>
-      <p:sp>
-        <p:nvSpPr>
-          <p:cNvPr id="17" name="PlaceHolder 4"/>
-          <p:cNvSpPr>
-            <a:spLocks noGrp="1"/>
-          </p:cNvSpPr>
-          <p:nvPr>
-            <p:ph type="body"/>
-          </p:nvPr>
-        </p:nvSpPr>
-        <p:spPr>
-          <a:xfrm>
-            <a:off x="5152680" y="3044520"/>
-            <a:ext cx="4426920" cy="1568520"/>
-          </a:xfrm>
-          <a:prstGeom prst="rect">
-            <a:avLst/>
-          </a:prstGeom>
-        </p:spPr>
-        <p:txBody>
-          <a:bodyPr lIns="0" rIns="0" tIns="0" bIns="0">
+            <a:endParaRPr b="0" lang="de-DE" sz="5690" spc="-1" strike="noStrike">
+              <a:latin typeface="Arial"/>
+            </a:endParaRPr>
+          </a:p>
+        </p:txBody>
+      </p:sp>
+      <p:sp>
+        <p:nvSpPr>
+          <p:cNvPr id="18" name="PlaceHolder 4"/>
+          <p:cNvSpPr>
+            <a:spLocks noGrp="1"/>
+          </p:cNvSpPr>
+          <p:nvPr>
+            <p:ph/>
+          </p:nvPr>
+        </p:nvSpPr>
+        <p:spPr>
+          <a:xfrm>
+            <a:off x="2898000" y="5411160"/>
+            <a:ext cx="2489760" cy="2787840"/>
+          </a:xfrm>
+          <a:prstGeom prst="rect">
+            <a:avLst/>
+          </a:prstGeom>
+          <a:noFill/>
+          <a:ln w="0">
+            <a:noFill/>
+          </a:ln>
+        </p:spPr>
+        <p:txBody>
+          <a:bodyPr lIns="0" rIns="0" tIns="0" bIns="0" anchor="t">
             <a:normAutofit/>
           </a:bodyPr>
           <a:p>
-            <a:endParaRPr b="0" lang="de-DE" sz="3200" spc="-1" strike="noStrike">
+            <a:endParaRPr b="0" lang="de-DE" sz="5690" spc="-1" strike="noStrike">
               <a:latin typeface="Arial"/>
             </a:endParaRPr>
           </a:p>
@@ -1244,7 +1394,7 @@
       </p:grpSpPr>
       <p:sp>
         <p:nvSpPr>
-          <p:cNvPr id="18" name="PlaceHolder 1"/>
+          <p:cNvPr id="19" name="PlaceHolder 1"/>
           <p:cNvSpPr>
             <a:spLocks noGrp="1"/>
           </p:cNvSpPr>
@@ -1254,110 +1404,128 @@
         </p:nvSpPr>
         <p:spPr>
           <a:xfrm>
-            <a:off x="504000" y="226080"/>
-            <a:ext cx="9071280" cy="946080"/>
-          </a:xfrm>
-          <a:prstGeom prst="rect">
-            <a:avLst/>
-          </a:prstGeom>
+            <a:off x="283320" y="134280"/>
+            <a:ext cx="5101920" cy="2216520"/>
+          </a:xfrm>
+          <a:prstGeom prst="rect">
+            <a:avLst/>
+          </a:prstGeom>
+          <a:noFill/>
+          <a:ln w="0">
+            <a:noFill/>
+          </a:ln>
         </p:spPr>
         <p:txBody>
           <a:bodyPr lIns="0" rIns="0" tIns="0" bIns="0" anchor="ctr">
             <a:noAutofit/>
           </a:bodyPr>
           <a:p>
-            <a:pPr algn="ctr"/>
-            <a:endParaRPr b="0" lang="de-DE" sz="4400" spc="-1" strike="noStrike">
-              <a:latin typeface="Arial"/>
-            </a:endParaRPr>
-          </a:p>
-        </p:txBody>
-      </p:sp>
-      <p:sp>
-        <p:nvSpPr>
-          <p:cNvPr id="19" name="PlaceHolder 2"/>
-          <p:cNvSpPr>
-            <a:spLocks noGrp="1"/>
-          </p:cNvSpPr>
-          <p:nvPr>
-            <p:ph type="body"/>
-          </p:nvPr>
-        </p:nvSpPr>
-        <p:spPr>
-          <a:xfrm>
-            <a:off x="504000" y="1326600"/>
-            <a:ext cx="4426920" cy="1568520"/>
-          </a:xfrm>
-          <a:prstGeom prst="rect">
-            <a:avLst/>
-          </a:prstGeom>
-        </p:spPr>
-        <p:txBody>
-          <a:bodyPr lIns="0" rIns="0" tIns="0" bIns="0">
+            <a:pPr algn="ctr">
+              <a:buNone/>
+            </a:pPr>
+            <a:endParaRPr b="0" lang="de-DE" sz="7819" spc="-1" strike="noStrike">
+              <a:latin typeface="Arial"/>
+            </a:endParaRPr>
+          </a:p>
+        </p:txBody>
+      </p:sp>
+      <p:sp>
+        <p:nvSpPr>
+          <p:cNvPr id="20" name="PlaceHolder 2"/>
+          <p:cNvSpPr>
+            <a:spLocks noGrp="1"/>
+          </p:cNvSpPr>
+          <p:nvPr>
+            <p:ph/>
+          </p:nvPr>
+        </p:nvSpPr>
+        <p:spPr>
+          <a:xfrm>
+            <a:off x="283320" y="2358000"/>
+            <a:ext cx="2489760" cy="2787840"/>
+          </a:xfrm>
+          <a:prstGeom prst="rect">
+            <a:avLst/>
+          </a:prstGeom>
+          <a:noFill/>
+          <a:ln w="0">
+            <a:noFill/>
+          </a:ln>
+        </p:spPr>
+        <p:txBody>
+          <a:bodyPr lIns="0" rIns="0" tIns="0" bIns="0" anchor="t">
             <a:normAutofit/>
           </a:bodyPr>
           <a:p>
-            <a:endParaRPr b="0" lang="de-DE" sz="3200" spc="-1" strike="noStrike">
-              <a:latin typeface="Arial"/>
-            </a:endParaRPr>
-          </a:p>
-        </p:txBody>
-      </p:sp>
-      <p:sp>
-        <p:nvSpPr>
-          <p:cNvPr id="20" name="PlaceHolder 3"/>
-          <p:cNvSpPr>
-            <a:spLocks noGrp="1"/>
-          </p:cNvSpPr>
-          <p:nvPr>
-            <p:ph type="body"/>
-          </p:nvPr>
-        </p:nvSpPr>
-        <p:spPr>
-          <a:xfrm>
-            <a:off x="5152680" y="1326600"/>
-            <a:ext cx="4426920" cy="1568520"/>
-          </a:xfrm>
-          <a:prstGeom prst="rect">
-            <a:avLst/>
-          </a:prstGeom>
-        </p:spPr>
-        <p:txBody>
-          <a:bodyPr lIns="0" rIns="0" tIns="0" bIns="0">
+            <a:endParaRPr b="0" lang="de-DE" sz="5690" spc="-1" strike="noStrike">
+              <a:latin typeface="Arial"/>
+            </a:endParaRPr>
+          </a:p>
+        </p:txBody>
+      </p:sp>
+      <p:sp>
+        <p:nvSpPr>
+          <p:cNvPr id="21" name="PlaceHolder 3"/>
+          <p:cNvSpPr>
+            <a:spLocks noGrp="1"/>
+          </p:cNvSpPr>
+          <p:nvPr>
+            <p:ph/>
+          </p:nvPr>
+        </p:nvSpPr>
+        <p:spPr>
+          <a:xfrm>
+            <a:off x="2898000" y="2358000"/>
+            <a:ext cx="2489760" cy="2787840"/>
+          </a:xfrm>
+          <a:prstGeom prst="rect">
+            <a:avLst/>
+          </a:prstGeom>
+          <a:noFill/>
+          <a:ln w="0">
+            <a:noFill/>
+          </a:ln>
+        </p:spPr>
+        <p:txBody>
+          <a:bodyPr lIns="0" rIns="0" tIns="0" bIns="0" anchor="t">
             <a:normAutofit/>
           </a:bodyPr>
           <a:p>
-            <a:endParaRPr b="0" lang="de-DE" sz="3200" spc="-1" strike="noStrike">
-              <a:latin typeface="Arial"/>
-            </a:endParaRPr>
-          </a:p>
-        </p:txBody>
-      </p:sp>
-      <p:sp>
-        <p:nvSpPr>
-          <p:cNvPr id="21" name="PlaceHolder 4"/>
-          <p:cNvSpPr>
-            <a:spLocks noGrp="1"/>
-          </p:cNvSpPr>
-          <p:nvPr>
-            <p:ph type="body"/>
-          </p:nvPr>
-        </p:nvSpPr>
-        <p:spPr>
-          <a:xfrm>
-            <a:off x="504000" y="3044520"/>
-            <a:ext cx="9072000" cy="1568520"/>
-          </a:xfrm>
-          <a:prstGeom prst="rect">
-            <a:avLst/>
-          </a:prstGeom>
-        </p:spPr>
-        <p:txBody>
-          <a:bodyPr lIns="0" rIns="0" tIns="0" bIns="0">
+            <a:endParaRPr b="0" lang="de-DE" sz="5690" spc="-1" strike="noStrike">
+              <a:latin typeface="Arial"/>
+            </a:endParaRPr>
+          </a:p>
+        </p:txBody>
+      </p:sp>
+      <p:sp>
+        <p:nvSpPr>
+          <p:cNvPr id="22" name="PlaceHolder 4"/>
+          <p:cNvSpPr>
+            <a:spLocks noGrp="1"/>
+          </p:cNvSpPr>
+          <p:nvPr>
+            <p:ph/>
+          </p:nvPr>
+        </p:nvSpPr>
+        <p:spPr>
+          <a:xfrm>
+            <a:off x="283320" y="5411160"/>
+            <a:ext cx="5102280" cy="2787840"/>
+          </a:xfrm>
+          <a:prstGeom prst="rect">
+            <a:avLst/>
+          </a:prstGeom>
+          <a:noFill/>
+          <a:ln w="0">
+            <a:noFill/>
+          </a:ln>
+        </p:spPr>
+        <p:txBody>
+          <a:bodyPr lIns="0" rIns="0" tIns="0" bIns="0" anchor="t">
             <a:normAutofit/>
           </a:bodyPr>
           <a:p>
-            <a:endParaRPr b="0" lang="de-DE" sz="3200" spc="-1" strike="noStrike">
+            <a:endParaRPr b="0" lang="de-DE" sz="5690" spc="-1" strike="noStrike">
               <a:latin typeface="Arial"/>
             </a:endParaRPr>
           </a:p>
@@ -1397,12 +1565,16 @@
         </p:nvSpPr>
         <p:spPr>
           <a:xfrm>
-            <a:off x="504000" y="226080"/>
-            <a:ext cx="9071280" cy="946080"/>
-          </a:xfrm>
-          <a:prstGeom prst="rect">
-            <a:avLst/>
-          </a:prstGeom>
+            <a:off x="283320" y="401760"/>
+            <a:ext cx="5101920" cy="1681200"/>
+          </a:xfrm>
+          <a:prstGeom prst="rect">
+            <a:avLst/>
+          </a:prstGeom>
+          <a:noFill/>
+          <a:ln w="0">
+            <a:noFill/>
+          </a:ln>
         </p:spPr>
         <p:txBody>
           <a:bodyPr lIns="0" rIns="0" tIns="0" bIns="0" anchor="ctr">
@@ -1414,6 +1586,189 @@
                 <a:latin typeface="Arial"/>
               </a:rPr>
               <a:t>Click to edit the title text format</a:t>
+            </a:r>
+            <a:endParaRPr b="0" lang="de-DE" sz="1800" spc="-1" strike="noStrike">
+              <a:latin typeface="Arial"/>
+            </a:endParaRPr>
+          </a:p>
+        </p:txBody>
+      </p:sp>
+      <p:sp>
+        <p:nvSpPr>
+          <p:cNvPr id="1" name="PlaceHolder 2"/>
+          <p:cNvSpPr>
+            <a:spLocks noGrp="1"/>
+          </p:cNvSpPr>
+          <p:nvPr>
+            <p:ph type="body"/>
+          </p:nvPr>
+        </p:nvSpPr>
+        <p:spPr>
+          <a:xfrm>
+            <a:off x="283320" y="2358000"/>
+            <a:ext cx="5102280" cy="5844960"/>
+          </a:xfrm>
+          <a:prstGeom prst="rect">
+            <a:avLst/>
+          </a:prstGeom>
+          <a:noFill/>
+          <a:ln w="0">
+            <a:noFill/>
+          </a:ln>
+        </p:spPr>
+        <p:txBody>
+          <a:bodyPr lIns="0" rIns="0" tIns="0" bIns="0" anchor="t">
+            <a:normAutofit/>
+          </a:bodyPr>
+          <a:p>
+            <a:pPr marL="432000" indent="-324000">
+              <a:spcBef>
+                <a:spcPts val="2517"/>
+              </a:spcBef>
+              <a:buClr>
+                <a:srgbClr val="000000"/>
+              </a:buClr>
+              <a:buSzPct val="45000"/>
+              <a:buFont typeface="Wingdings" charset="2"/>
+              <a:buChar char=""/>
+            </a:pPr>
+            <a:r>
+              <a:rPr b="0" lang="de-DE" sz="1800" spc="-1" strike="noStrike">
+                <a:latin typeface="Arial"/>
+              </a:rPr>
+              <a:t>Click to edit the outline text format</a:t>
+            </a:r>
+            <a:endParaRPr b="0" lang="de-DE" sz="1800" spc="-1" strike="noStrike">
+              <a:latin typeface="Arial"/>
+            </a:endParaRPr>
+          </a:p>
+          <a:p>
+            <a:pPr lvl="1" marL="864000" indent="-324000">
+              <a:spcBef>
+                <a:spcPts val="2013"/>
+              </a:spcBef>
+              <a:buClr>
+                <a:srgbClr val="000000"/>
+              </a:buClr>
+              <a:buSzPct val="75000"/>
+              <a:buFont typeface="Symbol" charset="2"/>
+              <a:buChar char=""/>
+            </a:pPr>
+            <a:r>
+              <a:rPr b="0" lang="de-DE" sz="1800" spc="-1" strike="noStrike">
+                <a:latin typeface="Arial"/>
+              </a:rPr>
+              <a:t>Second Outline Level</a:t>
+            </a:r>
+            <a:endParaRPr b="0" lang="de-DE" sz="1800" spc="-1" strike="noStrike">
+              <a:latin typeface="Arial"/>
+            </a:endParaRPr>
+          </a:p>
+          <a:p>
+            <a:pPr lvl="2" marL="1296000" indent="-288000">
+              <a:spcBef>
+                <a:spcPts val="1511"/>
+              </a:spcBef>
+              <a:buClr>
+                <a:srgbClr val="000000"/>
+              </a:buClr>
+              <a:buSzPct val="45000"/>
+              <a:buFont typeface="Wingdings" charset="2"/>
+              <a:buChar char=""/>
+            </a:pPr>
+            <a:r>
+              <a:rPr b="0" lang="de-DE" sz="1800" spc="-1" strike="noStrike">
+                <a:latin typeface="Arial"/>
+              </a:rPr>
+              <a:t>Third Outline Level</a:t>
+            </a:r>
+            <a:endParaRPr b="0" lang="de-DE" sz="1800" spc="-1" strike="noStrike">
+              <a:latin typeface="Arial"/>
+            </a:endParaRPr>
+          </a:p>
+          <a:p>
+            <a:pPr lvl="3" marL="1728000" indent="-216000">
+              <a:spcBef>
+                <a:spcPts val="1006"/>
+              </a:spcBef>
+              <a:buClr>
+                <a:srgbClr val="000000"/>
+              </a:buClr>
+              <a:buSzPct val="75000"/>
+              <a:buFont typeface="Symbol" charset="2"/>
+              <a:buChar char=""/>
+            </a:pPr>
+            <a:r>
+              <a:rPr b="0" lang="de-DE" sz="1800" spc="-1" strike="noStrike">
+                <a:latin typeface="Arial"/>
+              </a:rPr>
+              <a:t>Fourth Outline Level</a:t>
+            </a:r>
+            <a:endParaRPr b="0" lang="de-DE" sz="1800" spc="-1" strike="noStrike">
+              <a:latin typeface="Arial"/>
+            </a:endParaRPr>
+          </a:p>
+          <a:p>
+            <a:pPr lvl="4" marL="2160000" indent="-216000">
+              <a:spcBef>
+                <a:spcPts val="502"/>
+              </a:spcBef>
+              <a:buClr>
+                <a:srgbClr val="000000"/>
+              </a:buClr>
+              <a:buSzPct val="45000"/>
+              <a:buFont typeface="Wingdings" charset="2"/>
+              <a:buChar char=""/>
+            </a:pPr>
+            <a:r>
+              <a:rPr b="0" lang="de-DE" sz="1800" spc="-1" strike="noStrike">
+                <a:latin typeface="Arial"/>
+              </a:rPr>
+              <a:t>Fifth Outline Level</a:t>
+            </a:r>
+            <a:endParaRPr b="0" lang="de-DE" sz="1800" spc="-1" strike="noStrike">
+              <a:latin typeface="Arial"/>
+            </a:endParaRPr>
+          </a:p>
+          <a:p>
+            <a:pPr lvl="5" marL="2592000" indent="-216000">
+              <a:spcBef>
+                <a:spcPts val="502"/>
+              </a:spcBef>
+              <a:buClr>
+                <a:srgbClr val="000000"/>
+              </a:buClr>
+              <a:buSzPct val="45000"/>
+              <a:buFont typeface="Wingdings" charset="2"/>
+              <a:buChar char=""/>
+            </a:pPr>
+            <a:r>
+              <a:rPr b="0" lang="de-DE" sz="1800" spc="-1" strike="noStrike">
+                <a:latin typeface="Arial"/>
+              </a:rPr>
+              <a:t>Sixth Outline Level</a:t>
+            </a:r>
+            <a:endParaRPr b="0" lang="de-DE" sz="1800" spc="-1" strike="noStrike">
+              <a:latin typeface="Arial"/>
+            </a:endParaRPr>
+          </a:p>
+          <a:p>
+            <a:pPr lvl="6" marL="3024000" indent="-216000">
+              <a:spcBef>
+                <a:spcPts val="502"/>
+              </a:spcBef>
+              <a:buClr>
+                <a:srgbClr val="000000"/>
+              </a:buClr>
+              <a:buSzPct val="45000"/>
+              <a:buFont typeface="Wingdings" charset="2"/>
+              <a:buChar char=""/>
+            </a:pPr>
+            <a:r>
+              <a:rPr b="0" lang="de-DE" sz="1800" spc="-1" strike="noStrike">
+                <a:latin typeface="Arial"/>
+              </a:rPr>
+              <a:t>Seventh Outline Level</a:t>
             </a:r>
             <a:endParaRPr b="0" lang="de-DE" sz="1800" spc="-1" strike="noStrike">
               <a:latin typeface="Arial"/>
@@ -1460,14 +1815,14 @@
       </p:grpSpPr>
       <p:sp>
         <p:nvSpPr>
-          <p:cNvPr id="37" name=""/>
+          <p:cNvPr id="38" name=""/>
           <p:cNvSpPr/>
           <p:nvPr/>
         </p:nvSpPr>
         <p:spPr>
           <a:xfrm>
-            <a:off x="4860000" y="231120"/>
-            <a:ext cx="4715280" cy="1249920"/>
+            <a:off x="2700000" y="-241200"/>
+            <a:ext cx="2651760" cy="2221200"/>
           </a:xfrm>
           <a:prstGeom prst="rect">
             <a:avLst/>
@@ -1492,29 +1847,34 @@
               <a:lnSpc>
                 <a:spcPct val="100000"/>
               </a:lnSpc>
+              <a:buNone/>
             </a:pPr>
             <a:r>
-              <a:rPr b="0" lang="de-DE" sz="4400" spc="-1" strike="noStrike">
+              <a:rPr b="0" lang="de-DE" sz="3200" spc="-1" strike="noStrike">
+                <a:solidFill>
+                  <a:srgbClr val="000000"/>
+                </a:solidFill>
                 <a:latin typeface="Arial"/>
+                <a:ea typeface="DejaVu Sans"/>
               </a:rPr>
               <a:t>Kaufprozess von Elektronik</a:t>
             </a:r>
-            <a:endParaRPr b="0" lang="de-DE" sz="4400" spc="-1" strike="noStrike">
-              <a:latin typeface="Arial"/>
-            </a:endParaRPr>
-          </a:p>
-        </p:txBody>
-      </p:sp>
-      <p:sp>
-        <p:nvSpPr>
-          <p:cNvPr id="38" name=""/>
+            <a:endParaRPr b="0" lang="de-DE" sz="3200" spc="-1" strike="noStrike">
+              <a:latin typeface="Arial"/>
+            </a:endParaRPr>
+          </a:p>
+        </p:txBody>
+      </p:sp>
+      <p:sp>
+        <p:nvSpPr>
+          <p:cNvPr id="39" name=""/>
           <p:cNvSpPr/>
           <p:nvPr/>
         </p:nvSpPr>
         <p:spPr>
           <a:xfrm>
-            <a:off x="504000" y="426600"/>
-            <a:ext cx="1655640" cy="653040"/>
+            <a:off x="283320" y="1620000"/>
+            <a:ext cx="1876680" cy="900000"/>
           </a:xfrm>
           <a:prstGeom prst="rect">
             <a:avLst/>
@@ -1541,12 +1901,17 @@
               <a:lnSpc>
                 <a:spcPct val="100000"/>
               </a:lnSpc>
+              <a:buNone/>
             </a:pPr>
             <a:r>
               <a:rPr b="0" lang="de-DE" sz="1400" spc="-1" strike="noStrike">
+                <a:solidFill>
+                  <a:srgbClr val="000000"/>
+                </a:solidFill>
                 <a:latin typeface="Arial"/>
+                <a:ea typeface="DejaVu Sans"/>
               </a:rPr>
-              <a:t>Kenntnis über die neue Technik</a:t>
+              <a:t>Kenntnis über die neue Elektronik</a:t>
             </a:r>
             <a:endParaRPr b="0" lang="de-DE" sz="1400" spc="-1" strike="noStrike">
               <a:latin typeface="Arial"/>
@@ -1556,14 +1921,14 @@
       </p:sp>
       <p:sp>
         <p:nvSpPr>
-          <p:cNvPr id="39" name=""/>
+          <p:cNvPr id="40" name=""/>
           <p:cNvSpPr/>
           <p:nvPr/>
         </p:nvSpPr>
         <p:spPr>
           <a:xfrm>
-            <a:off x="504360" y="3240000"/>
-            <a:ext cx="1655640" cy="653040"/>
+            <a:off x="283680" y="6801120"/>
+            <a:ext cx="930960" cy="1159920"/>
           </a:xfrm>
           <a:prstGeom prst="rect">
             <a:avLst/>
@@ -1590,10 +1955,15 @@
               <a:lnSpc>
                 <a:spcPct val="100000"/>
               </a:lnSpc>
+              <a:buNone/>
             </a:pPr>
             <a:r>
               <a:rPr b="0" lang="de-DE" sz="1400" spc="-1" strike="noStrike">
+                <a:solidFill>
+                  <a:srgbClr val="000000"/>
+                </a:solidFill>
                 <a:latin typeface="Arial"/>
+                <a:ea typeface="DejaVu Sans"/>
               </a:rPr>
               <a:t>Kann ich das gebrauchen?</a:t>
             </a:r>
@@ -1605,14 +1975,14 @@
       </p:sp>
       <p:sp>
         <p:nvSpPr>
-          <p:cNvPr id="40" name=""/>
+          <p:cNvPr id="41" name=""/>
           <p:cNvSpPr/>
           <p:nvPr/>
         </p:nvSpPr>
         <p:spPr>
           <a:xfrm>
-            <a:off x="2700000" y="2340000"/>
-            <a:ext cx="1655640" cy="653040"/>
+            <a:off x="1518480" y="5201280"/>
+            <a:ext cx="930960" cy="1159920"/>
           </a:xfrm>
           <a:prstGeom prst="rect">
             <a:avLst/>
@@ -1639,10 +2009,15 @@
               <a:lnSpc>
                 <a:spcPct val="100000"/>
               </a:lnSpc>
+              <a:buNone/>
             </a:pPr>
             <a:r>
               <a:rPr b="0" lang="de-DE" sz="1400" spc="-1" strike="noStrike">
+                <a:solidFill>
+                  <a:srgbClr val="000000"/>
+                </a:solidFill>
                 <a:latin typeface="Arial"/>
+                <a:ea typeface="DejaVu Sans"/>
               </a:rPr>
               <a:t>Erleichtert es mir den Alltag</a:t>
             </a:r>
@@ -1654,14 +2029,14 @@
       </p:sp>
       <p:sp>
         <p:nvSpPr>
-          <p:cNvPr id="41" name=""/>
+          <p:cNvPr id="42" name=""/>
           <p:cNvSpPr/>
           <p:nvPr/>
         </p:nvSpPr>
         <p:spPr>
           <a:xfrm>
-            <a:off x="540000" y="4386600"/>
-            <a:ext cx="1655640" cy="653040"/>
+            <a:off x="303840" y="8839080"/>
+            <a:ext cx="930960" cy="1159920"/>
           </a:xfrm>
           <a:prstGeom prst="rect">
             <a:avLst/>
@@ -1688,10 +2063,15 @@
               <a:lnSpc>
                 <a:spcPct val="100000"/>
               </a:lnSpc>
+              <a:buNone/>
             </a:pPr>
             <a:r>
               <a:rPr b="0" lang="de-DE" sz="1400" spc="-1" strike="noStrike">
+                <a:solidFill>
+                  <a:srgbClr val="000000"/>
+                </a:solidFill>
                 <a:latin typeface="Arial"/>
+                <a:ea typeface="DejaVu Sans"/>
               </a:rPr>
               <a:t>Kein Kauf</a:t>
             </a:r>
@@ -1703,14 +2083,14 @@
       </p:sp>
       <p:sp>
         <p:nvSpPr>
-          <p:cNvPr id="42" name=""/>
+          <p:cNvPr id="43" name=""/>
           <p:cNvSpPr/>
           <p:nvPr/>
         </p:nvSpPr>
         <p:spPr>
           <a:xfrm>
-            <a:off x="4860000" y="2340000"/>
-            <a:ext cx="1655640" cy="653040"/>
+            <a:off x="2733480" y="5201280"/>
+            <a:ext cx="930960" cy="1159920"/>
           </a:xfrm>
           <a:prstGeom prst="rect">
             <a:avLst/>
@@ -1737,10 +2117,15 @@
               <a:lnSpc>
                 <a:spcPct val="100000"/>
               </a:lnSpc>
+              <a:buNone/>
             </a:pPr>
             <a:r>
               <a:rPr b="0" lang="de-DE" sz="1400" spc="-1" strike="noStrike">
+                <a:solidFill>
+                  <a:srgbClr val="000000"/>
+                </a:solidFill>
                 <a:latin typeface="Arial"/>
+                <a:ea typeface="DejaVu Sans"/>
               </a:rPr>
               <a:t>Kann ich es gebraucht kaufen?</a:t>
             </a:r>
@@ -1752,14 +2137,14 @@
       </p:sp>
       <p:sp>
         <p:nvSpPr>
-          <p:cNvPr id="43" name=""/>
+          <p:cNvPr id="44" name=""/>
           <p:cNvSpPr/>
           <p:nvPr/>
         </p:nvSpPr>
         <p:spPr>
           <a:xfrm>
-            <a:off x="4860000" y="3600000"/>
-            <a:ext cx="1655640" cy="653040"/>
+            <a:off x="2733480" y="7440840"/>
+            <a:ext cx="930960" cy="1159920"/>
           </a:xfrm>
           <a:prstGeom prst="rect">
             <a:avLst/>
@@ -1786,10 +2171,15 @@
               <a:lnSpc>
                 <a:spcPct val="100000"/>
               </a:lnSpc>
+              <a:buNone/>
             </a:pPr>
             <a:r>
               <a:rPr b="0" lang="de-DE" sz="1400" spc="-1" strike="noStrike">
+                <a:solidFill>
+                  <a:srgbClr val="000000"/>
+                </a:solidFill>
                 <a:latin typeface="Arial"/>
+                <a:ea typeface="DejaVu Sans"/>
               </a:rPr>
               <a:t>Wie viele Resourcen werden bei Neukauf verbraucht?</a:t>
             </a:r>
@@ -1801,14 +2191,14 @@
       </p:sp>
       <p:sp>
         <p:nvSpPr>
-          <p:cNvPr id="44" name=""/>
+          <p:cNvPr id="45" name=""/>
           <p:cNvSpPr/>
           <p:nvPr/>
         </p:nvSpPr>
         <p:spPr>
           <a:xfrm>
-            <a:off x="7020000" y="2340000"/>
-            <a:ext cx="1655640" cy="653040"/>
+            <a:off x="3948480" y="5201280"/>
+            <a:ext cx="930960" cy="1159920"/>
           </a:xfrm>
           <a:prstGeom prst="rect">
             <a:avLst/>
@@ -1835,10 +2225,15 @@
               <a:lnSpc>
                 <a:spcPct val="100000"/>
               </a:lnSpc>
+              <a:buNone/>
             </a:pPr>
             <a:r>
               <a:rPr b="0" lang="de-DE" sz="1400" spc="-1" strike="noStrike">
+                <a:solidFill>
+                  <a:srgbClr val="000000"/>
+                </a:solidFill>
                 <a:latin typeface="Arial"/>
+                <a:ea typeface="DejaVu Sans"/>
               </a:rPr>
               <a:t>Abwarten ob ich es nach 4 Wochen noch misse.</a:t>
             </a:r>
@@ -1850,14 +2245,14 @@
       </p:sp>
       <p:sp>
         <p:nvSpPr>
-          <p:cNvPr id="45" name=""/>
+          <p:cNvPr id="46" name=""/>
           <p:cNvSpPr/>
           <p:nvPr/>
         </p:nvSpPr>
         <p:spPr>
           <a:xfrm>
-            <a:off x="7164000" y="3600000"/>
-            <a:ext cx="1655640" cy="653040"/>
+            <a:off x="4029480" y="7440840"/>
+            <a:ext cx="930960" cy="1159920"/>
           </a:xfrm>
           <a:prstGeom prst="rect">
             <a:avLst/>
@@ -1884,10 +2279,15 @@
               <a:lnSpc>
                 <a:spcPct val="100000"/>
               </a:lnSpc>
+              <a:buNone/>
             </a:pPr>
             <a:r>
               <a:rPr b="0" lang="de-DE" sz="1400" spc="-1" strike="noStrike">
+                <a:solidFill>
+                  <a:srgbClr val="000000"/>
+                </a:solidFill>
                 <a:latin typeface="Arial"/>
+                <a:ea typeface="DejaVu Sans"/>
               </a:rPr>
               <a:t>Vermisse ich es immer noch?</a:t>
             </a:r>
@@ -1899,14 +2299,14 @@
       </p:sp>
       <p:sp>
         <p:nvSpPr>
-          <p:cNvPr id="46" name=""/>
+          <p:cNvPr id="47" name=""/>
           <p:cNvSpPr/>
           <p:nvPr/>
         </p:nvSpPr>
         <p:spPr>
           <a:xfrm>
-            <a:off x="7704000" y="4566600"/>
-            <a:ext cx="1655640" cy="653040"/>
+            <a:off x="4333320" y="9159120"/>
+            <a:ext cx="930960" cy="1159920"/>
           </a:xfrm>
           <a:prstGeom prst="rect">
             <a:avLst/>
@@ -1933,10 +2333,15 @@
               <a:lnSpc>
                 <a:spcPct val="100000"/>
               </a:lnSpc>
+              <a:buNone/>
             </a:pPr>
             <a:r>
               <a:rPr b="0" lang="de-DE" sz="1400" spc="-1" strike="noStrike">
+                <a:solidFill>
+                  <a:srgbClr val="000000"/>
+                </a:solidFill>
                 <a:latin typeface="Arial"/>
+                <a:ea typeface="DejaVu Sans"/>
               </a:rPr>
               <a:t>Kauf</a:t>
             </a:r>
@@ -1948,14 +2353,14 @@
       </p:sp>
       <p:sp>
         <p:nvSpPr>
-          <p:cNvPr id="47" name=""/>
+          <p:cNvPr id="48" name=""/>
           <p:cNvSpPr/>
           <p:nvPr/>
         </p:nvSpPr>
         <p:spPr>
           <a:xfrm>
-            <a:off x="540000" y="1326600"/>
-            <a:ext cx="1655640" cy="653040"/>
+            <a:off x="303840" y="3399840"/>
+            <a:ext cx="930960" cy="1159920"/>
           </a:xfrm>
           <a:prstGeom prst="rect">
             <a:avLst/>
@@ -1982,10 +2387,15 @@
               <a:lnSpc>
                 <a:spcPct val="100000"/>
               </a:lnSpc>
+              <a:buNone/>
             </a:pPr>
             <a:r>
               <a:rPr b="0" lang="de-DE" sz="1400" spc="-1" strike="noStrike">
+                <a:solidFill>
+                  <a:srgbClr val="000000"/>
+                </a:solidFill>
                 <a:latin typeface="Arial"/>
+                <a:ea typeface="DejaVu Sans"/>
               </a:rPr>
               <a:t>Recherche über die neue Technik.</a:t>
             </a:r>
@@ -1997,14 +2407,14 @@
       </p:sp>
       <p:sp>
         <p:nvSpPr>
-          <p:cNvPr id="48" name=""/>
+          <p:cNvPr id="49" name=""/>
           <p:cNvSpPr/>
           <p:nvPr/>
         </p:nvSpPr>
         <p:spPr>
           <a:xfrm>
-            <a:off x="1260000" y="1080000"/>
-            <a:ext cx="360" cy="246600"/>
+            <a:off x="708480" y="2961360"/>
+            <a:ext cx="360" cy="438120"/>
           </a:xfrm>
           <a:prstGeom prst="line">
             <a:avLst/>
@@ -2025,14 +2435,14 @@
       </p:sp>
       <p:sp>
         <p:nvSpPr>
-          <p:cNvPr id="49" name=""/>
+          <p:cNvPr id="50" name=""/>
           <p:cNvSpPr/>
           <p:nvPr/>
         </p:nvSpPr>
         <p:spPr>
           <a:xfrm>
-            <a:off x="1260000" y="1980000"/>
-            <a:ext cx="360" cy="360000"/>
+            <a:off x="708480" y="4561200"/>
+            <a:ext cx="360" cy="639720"/>
           </a:xfrm>
           <a:prstGeom prst="line">
             <a:avLst/>
@@ -2053,14 +2463,14 @@
       </p:sp>
       <p:sp>
         <p:nvSpPr>
-          <p:cNvPr id="50" name=""/>
+          <p:cNvPr id="51" name=""/>
           <p:cNvSpPr/>
           <p:nvPr/>
         </p:nvSpPr>
         <p:spPr>
           <a:xfrm>
-            <a:off x="1440360" y="3960000"/>
-            <a:ext cx="0" cy="426600"/>
+            <a:off x="810000" y="8080920"/>
+            <a:ext cx="360" cy="758160"/>
           </a:xfrm>
           <a:prstGeom prst="line">
             <a:avLst/>
@@ -2081,14 +2491,14 @@
       </p:sp>
       <p:sp>
         <p:nvSpPr>
-          <p:cNvPr id="51" name=""/>
+          <p:cNvPr id="52" name=""/>
           <p:cNvSpPr/>
           <p:nvPr/>
         </p:nvSpPr>
         <p:spPr>
           <a:xfrm flipV="1">
-            <a:off x="2196000" y="2700360"/>
-            <a:ext cx="504000" cy="719640"/>
+            <a:off x="1235160" y="5841720"/>
+            <a:ext cx="283320" cy="1279080"/>
           </a:xfrm>
           <a:prstGeom prst="line">
             <a:avLst/>
@@ -2109,14 +2519,14 @@
       </p:sp>
       <p:sp>
         <p:nvSpPr>
-          <p:cNvPr id="52" name=""/>
+          <p:cNvPr id="53" name=""/>
           <p:cNvSpPr/>
           <p:nvPr/>
         </p:nvSpPr>
         <p:spPr>
           <a:xfrm>
-            <a:off x="4356000" y="2520000"/>
-            <a:ext cx="504000" cy="360"/>
+            <a:off x="2450160" y="5521320"/>
+            <a:ext cx="283320" cy="360"/>
           </a:xfrm>
           <a:prstGeom prst="line">
             <a:avLst/>
@@ -2137,14 +2547,14 @@
       </p:sp>
       <p:sp>
         <p:nvSpPr>
-          <p:cNvPr id="53" name=""/>
+          <p:cNvPr id="54" name=""/>
           <p:cNvSpPr/>
           <p:nvPr/>
         </p:nvSpPr>
         <p:spPr>
           <a:xfrm>
-            <a:off x="6120000" y="2993400"/>
-            <a:ext cx="360" cy="606600"/>
+            <a:off x="3441960" y="6362640"/>
+            <a:ext cx="360" cy="1078200"/>
           </a:xfrm>
           <a:prstGeom prst="line">
             <a:avLst/>
@@ -2165,14 +2575,14 @@
       </p:sp>
       <p:sp>
         <p:nvSpPr>
-          <p:cNvPr id="54" name=""/>
+          <p:cNvPr id="55" name=""/>
           <p:cNvSpPr/>
           <p:nvPr/>
         </p:nvSpPr>
         <p:spPr>
           <a:xfrm flipH="1">
-            <a:off x="2196000" y="2993400"/>
-            <a:ext cx="1404000" cy="1506600"/>
+            <a:off x="1235160" y="6362640"/>
+            <a:ext cx="789840" cy="2678040"/>
           </a:xfrm>
           <a:prstGeom prst="line">
             <a:avLst/>
@@ -2193,14 +2603,14 @@
       </p:sp>
       <p:sp>
         <p:nvSpPr>
-          <p:cNvPr id="55" name=""/>
+          <p:cNvPr id="56" name=""/>
           <p:cNvSpPr/>
           <p:nvPr/>
         </p:nvSpPr>
         <p:spPr>
           <a:xfrm flipH="1">
-            <a:off x="2196000" y="3960000"/>
-            <a:ext cx="2664000" cy="720000"/>
+            <a:off x="1235160" y="8080920"/>
+            <a:ext cx="1498320" cy="1279800"/>
           </a:xfrm>
           <a:prstGeom prst="line">
             <a:avLst/>
@@ -2221,14 +2631,14 @@
       </p:sp>
       <p:sp>
         <p:nvSpPr>
-          <p:cNvPr id="56" name=""/>
+          <p:cNvPr id="57" name=""/>
           <p:cNvSpPr/>
           <p:nvPr/>
         </p:nvSpPr>
         <p:spPr>
           <a:xfrm flipH="1">
-            <a:off x="2196000" y="4253400"/>
-            <a:ext cx="5184000" cy="606600"/>
+            <a:off x="1235160" y="8602560"/>
+            <a:ext cx="2915640" cy="1078200"/>
           </a:xfrm>
           <a:prstGeom prst="line">
             <a:avLst/>
@@ -2249,14 +2659,14 @@
       </p:sp>
       <p:sp>
         <p:nvSpPr>
-          <p:cNvPr id="57" name=""/>
+          <p:cNvPr id="58" name=""/>
           <p:cNvSpPr/>
           <p:nvPr/>
         </p:nvSpPr>
         <p:spPr>
           <a:xfrm>
-            <a:off x="6516000" y="2520000"/>
-            <a:ext cx="504000" cy="360"/>
+            <a:off x="3664800" y="5521320"/>
+            <a:ext cx="283320" cy="360"/>
           </a:xfrm>
           <a:prstGeom prst="line">
             <a:avLst/>
@@ -2277,14 +2687,14 @@
       </p:sp>
       <p:sp>
         <p:nvSpPr>
-          <p:cNvPr id="58" name=""/>
+          <p:cNvPr id="59" name=""/>
           <p:cNvSpPr/>
           <p:nvPr/>
         </p:nvSpPr>
         <p:spPr>
           <a:xfrm>
-            <a:off x="8280000" y="2993400"/>
-            <a:ext cx="360" cy="606600"/>
+            <a:off x="4656960" y="6362640"/>
+            <a:ext cx="360" cy="1078200"/>
           </a:xfrm>
           <a:prstGeom prst="line">
             <a:avLst/>
@@ -2305,14 +2715,14 @@
       </p:sp>
       <p:sp>
         <p:nvSpPr>
-          <p:cNvPr id="59" name=""/>
+          <p:cNvPr id="60" name=""/>
           <p:cNvSpPr/>
           <p:nvPr/>
         </p:nvSpPr>
         <p:spPr>
           <a:xfrm>
-            <a:off x="8460000" y="4253400"/>
-            <a:ext cx="360" cy="313200"/>
+            <a:off x="4758120" y="8602560"/>
+            <a:ext cx="360" cy="556560"/>
           </a:xfrm>
           <a:prstGeom prst="line">
             <a:avLst/>
@@ -2333,14 +2743,14 @@
       </p:sp>
       <p:sp>
         <p:nvSpPr>
-          <p:cNvPr id="60" name=""/>
+          <p:cNvPr id="61" name=""/>
           <p:cNvSpPr/>
           <p:nvPr/>
         </p:nvSpPr>
         <p:spPr>
           <a:xfrm>
-            <a:off x="504360" y="2340360"/>
-            <a:ext cx="1655640" cy="653040"/>
+            <a:off x="283680" y="5202000"/>
+            <a:ext cx="930960" cy="1159920"/>
           </a:xfrm>
           <a:prstGeom prst="rect">
             <a:avLst/>
@@ -2367,10 +2777,15 @@
               <a:lnSpc>
                 <a:spcPct val="100000"/>
               </a:lnSpc>
+              <a:buNone/>
             </a:pPr>
             <a:r>
               <a:rPr b="0" lang="de-DE" sz="1400" spc="-1" strike="noStrike">
+                <a:solidFill>
+                  <a:srgbClr val="000000"/>
+                </a:solidFill>
                 <a:latin typeface="Arial"/>
+                <a:ea typeface="DejaVu Sans"/>
               </a:rPr>
               <a:t>Sind die Kundenrezensionen gut?</a:t>
             </a:r>
@@ -2382,14 +2797,14 @@
       </p:sp>
       <p:sp>
         <p:nvSpPr>
-          <p:cNvPr id="61" name=""/>
+          <p:cNvPr id="62" name=""/>
           <p:cNvSpPr/>
           <p:nvPr/>
         </p:nvSpPr>
         <p:spPr>
           <a:xfrm>
-            <a:off x="1260000" y="2993400"/>
-            <a:ext cx="0" cy="246600"/>
+            <a:off x="708480" y="6362640"/>
+            <a:ext cx="360" cy="438120"/>
           </a:xfrm>
           <a:prstGeom prst="line">
             <a:avLst/>
@@ -2410,14 +2825,14 @@
       </p:sp>
       <p:sp>
         <p:nvSpPr>
-          <p:cNvPr id="62" name=""/>
+          <p:cNvPr id="63" name=""/>
           <p:cNvSpPr/>
           <p:nvPr/>
         </p:nvSpPr>
         <p:spPr>
           <a:xfrm>
-            <a:off x="504360" y="2700000"/>
-            <a:ext cx="215640" cy="1686600"/>
+            <a:off x="283680" y="5841000"/>
+            <a:ext cx="120960" cy="2998080"/>
           </a:xfrm>
           <a:prstGeom prst="line">
             <a:avLst/>
@@ -2435,6 +2850,60 @@
           <a:effectRef idx="0"/>
           <a:fontRef idx="minor"/>
         </p:style>
+      </p:sp>
+      <p:sp>
+        <p:nvSpPr>
+          <p:cNvPr id="64" name=""/>
+          <p:cNvSpPr/>
+          <p:nvPr/>
+        </p:nvSpPr>
+        <p:spPr>
+          <a:xfrm>
+            <a:off x="329040" y="460080"/>
+            <a:ext cx="1830960" cy="799920"/>
+          </a:xfrm>
+          <a:prstGeom prst="rect">
+            <a:avLst/>
+          </a:prstGeom>
+          <a:noFill/>
+          <a:ln w="0">
+            <a:solidFill>
+              <a:srgbClr val="3465a4"/>
+            </a:solidFill>
+          </a:ln>
+        </p:spPr>
+        <p:style>
+          <a:lnRef idx="0"/>
+          <a:fillRef idx="0"/>
+          <a:effectRef idx="0"/>
+          <a:fontRef idx="minor"/>
+        </p:style>
+        <p:txBody>
+          <a:bodyPr lIns="0" rIns="0" tIns="0" bIns="0" anchor="ctr">
+            <a:noAutofit/>
+          </a:bodyPr>
+          <a:p>
+            <a:pPr algn="ctr">
+              <a:lnSpc>
+                <a:spcPct val="100000"/>
+              </a:lnSpc>
+              <a:buNone/>
+            </a:pPr>
+            <a:r>
+              <a:rPr b="0" lang="de-DE" sz="1400" spc="-1" strike="noStrike">
+                <a:solidFill>
+                  <a:srgbClr val="000000"/>
+                </a:solidFill>
+                <a:latin typeface="Arial"/>
+                <a:ea typeface="DejaVu Sans"/>
+              </a:rPr>
+              <a:t>Situation in der neue Elektronik benötigt wird</a:t>
+            </a:r>
+            <a:endParaRPr b="0" lang="de-DE" sz="1400" spc="-1" strike="noStrike">
+              <a:latin typeface="Arial"/>
+            </a:endParaRPr>
+          </a:p>
+        </p:txBody>
       </p:sp>
     </p:spTree>
   </p:cSld>

</xml_diff>